<commit_message>
a lot of changes in the background chapter again
</commit_message>
<xml_diff>
--- a/presentations/Zwischenpräsentation.pptx
+++ b/presentations/Zwischenpräsentation.pptx
@@ -5,32 +5,33 @@
     <p:sldMasterId id="2147483648" r:id="rId1"/>
   </p:sldMasterIdLst>
   <p:notesMasterIdLst>
-    <p:notesMasterId r:id="rId17"/>
+    <p:notesMasterId r:id="rId18"/>
   </p:notesMasterIdLst>
   <p:handoutMasterIdLst>
-    <p:handoutMasterId r:id="rId18"/>
+    <p:handoutMasterId r:id="rId19"/>
   </p:handoutMasterIdLst>
   <p:sldIdLst>
     <p:sldId id="258" r:id="rId2"/>
     <p:sldId id="364" r:id="rId3"/>
     <p:sldId id="374" r:id="rId4"/>
-    <p:sldId id="380" r:id="rId5"/>
-    <p:sldId id="367" r:id="rId6"/>
-    <p:sldId id="376" r:id="rId7"/>
-    <p:sldId id="377" r:id="rId8"/>
-    <p:sldId id="378" r:id="rId9"/>
-    <p:sldId id="379" r:id="rId10"/>
-    <p:sldId id="366" r:id="rId11"/>
-    <p:sldId id="369" r:id="rId12"/>
-    <p:sldId id="375" r:id="rId13"/>
-    <p:sldId id="370" r:id="rId14"/>
-    <p:sldId id="371" r:id="rId15"/>
-    <p:sldId id="373" r:id="rId16"/>
+    <p:sldId id="381" r:id="rId5"/>
+    <p:sldId id="380" r:id="rId6"/>
+    <p:sldId id="367" r:id="rId7"/>
+    <p:sldId id="376" r:id="rId8"/>
+    <p:sldId id="377" r:id="rId9"/>
+    <p:sldId id="378" r:id="rId10"/>
+    <p:sldId id="379" r:id="rId11"/>
+    <p:sldId id="366" r:id="rId12"/>
+    <p:sldId id="369" r:id="rId13"/>
+    <p:sldId id="375" r:id="rId14"/>
+    <p:sldId id="370" r:id="rId15"/>
+    <p:sldId id="371" r:id="rId16"/>
+    <p:sldId id="373" r:id="rId17"/>
   </p:sldIdLst>
   <p:sldSz cx="12192000" cy="6858000"/>
   <p:notesSz cx="6799263" cy="9929813"/>
   <p:custDataLst>
-    <p:tags r:id="rId19"/>
+    <p:tags r:id="rId20"/>
   </p:custDataLst>
   <p:defaultTextStyle>
     <a:defPPr>
@@ -165,6 +166,7 @@
             <p14:sldId id="258"/>
             <p14:sldId id="364"/>
             <p14:sldId id="374"/>
+            <p14:sldId id="381"/>
             <p14:sldId id="380"/>
             <p14:sldId id="367"/>
             <p14:sldId id="376"/>
@@ -2329,7 +2331,7 @@
   <dgm:whole/>
   <dgm:extLst>
     <a:ext uri="http://schemas.microsoft.com/office/drawing/2008/diagram">
-      <dsp:dataModelExt xmlns:dsp="http://schemas.microsoft.com/office/drawing/2008/diagram" relId="rId6" minVer="http://schemas.openxmlformats.org/drawingml/2006/diagram"/>
+      <dsp:dataModelExt xmlns:dsp="http://schemas.microsoft.com/office/drawing/2008/diagram" relId="rId7" minVer="http://schemas.openxmlformats.org/drawingml/2006/diagram"/>
     </a:ext>
   </dgm:extLst>
 </dgm:dataModel>
@@ -2801,8 +2803,8 @@
       </dsp:nvSpPr>
       <dsp:spPr>
         <a:xfrm>
-          <a:off x="0" y="203"/>
-          <a:ext cx="3185426" cy="839272"/>
+          <a:off x="1167873" y="0"/>
+          <a:ext cx="3187929" cy="839932"/>
         </a:xfrm>
         <a:prstGeom prst="roundRect">
           <a:avLst>
@@ -2885,8 +2887,8 @@
         </a:p>
       </dsp:txBody>
       <dsp:txXfrm>
-        <a:off x="24581" y="24784"/>
-        <a:ext cx="3136264" cy="790110"/>
+        <a:off x="1192474" y="24601"/>
+        <a:ext cx="3138727" cy="790730"/>
       </dsp:txXfrm>
     </dsp:sp>
     <dsp:sp modelId="{02A0B113-0600-412A-9DC9-0CB4C86240C9}">
@@ -2896,8 +2898,8 @@
       </dsp:nvSpPr>
       <dsp:spPr>
         <a:xfrm>
-          <a:off x="318542" y="839475"/>
-          <a:ext cx="233435" cy="627910"/>
+          <a:off x="1486666" y="839932"/>
+          <a:ext cx="322774" cy="626627"/>
         </a:xfrm>
         <a:custGeom>
           <a:avLst/>
@@ -2911,10 +2913,10 @@
                 <a:pt x="0" y="0"/>
               </a:moveTo>
               <a:lnTo>
-                <a:pt x="0" y="627910"/>
+                <a:pt x="0" y="626627"/>
               </a:lnTo>
               <a:lnTo>
-                <a:pt x="233435" y="627910"/>
+                <a:pt x="322774" y="626627"/>
               </a:lnTo>
             </a:path>
           </a:pathLst>
@@ -2954,8 +2956,8 @@
       </dsp:nvSpPr>
       <dsp:spPr>
         <a:xfrm>
-          <a:off x="551978" y="1047749"/>
-          <a:ext cx="1342836" cy="839272"/>
+          <a:off x="1809440" y="1046593"/>
+          <a:ext cx="1343891" cy="839932"/>
         </a:xfrm>
         <a:prstGeom prst="roundRect">
           <a:avLst>
@@ -3021,8 +3023,8 @@
         </a:p>
       </dsp:txBody>
       <dsp:txXfrm>
-        <a:off x="576559" y="1072330"/>
-        <a:ext cx="1293674" cy="790110"/>
+        <a:off x="1834041" y="1071194"/>
+        <a:ext cx="1294689" cy="790730"/>
       </dsp:txXfrm>
     </dsp:sp>
     <dsp:sp modelId="{9C1EE911-2B8C-423A-A5C5-C7BE96855221}">
@@ -3032,8 +3034,8 @@
       </dsp:nvSpPr>
       <dsp:spPr>
         <a:xfrm>
-          <a:off x="318542" y="839475"/>
-          <a:ext cx="233435" cy="1675088"/>
+          <a:off x="1486666" y="839932"/>
+          <a:ext cx="322774" cy="1674627"/>
         </a:xfrm>
         <a:custGeom>
           <a:avLst/>
@@ -3047,10 +3049,10 @@
                 <a:pt x="0" y="0"/>
               </a:moveTo>
               <a:lnTo>
-                <a:pt x="0" y="1675088"/>
+                <a:pt x="0" y="1674627"/>
               </a:lnTo>
               <a:lnTo>
-                <a:pt x="233435" y="1675088"/>
+                <a:pt x="322774" y="1674627"/>
               </a:lnTo>
             </a:path>
           </a:pathLst>
@@ -3090,8 +3092,8 @@
       </dsp:nvSpPr>
       <dsp:spPr>
         <a:xfrm>
-          <a:off x="551978" y="2094927"/>
-          <a:ext cx="1342836" cy="839272"/>
+          <a:off x="1809440" y="2094593"/>
+          <a:ext cx="1343891" cy="839932"/>
         </a:xfrm>
         <a:prstGeom prst="roundRect">
           <a:avLst>
@@ -3158,8 +3160,8 @@
         </a:p>
       </dsp:txBody>
       <dsp:txXfrm>
-        <a:off x="576559" y="2119508"/>
-        <a:ext cx="1293674" cy="790110"/>
+        <a:off x="1834041" y="2119194"/>
+        <a:ext cx="1294689" cy="790730"/>
       </dsp:txXfrm>
     </dsp:sp>
     <dsp:sp modelId="{58B1074D-0F5C-4728-9218-072CFFBFA7F1}">
@@ -3169,8 +3171,8 @@
       </dsp:nvSpPr>
       <dsp:spPr>
         <a:xfrm>
-          <a:off x="318542" y="839475"/>
-          <a:ext cx="206847" cy="2705043"/>
+          <a:off x="1486666" y="839932"/>
+          <a:ext cx="296165" cy="2705392"/>
         </a:xfrm>
         <a:custGeom>
           <a:avLst/>
@@ -3184,10 +3186,10 @@
                 <a:pt x="0" y="0"/>
               </a:moveTo>
               <a:lnTo>
-                <a:pt x="0" y="2705043"/>
+                <a:pt x="0" y="2705392"/>
               </a:lnTo>
               <a:lnTo>
-                <a:pt x="206847" y="2705043"/>
+                <a:pt x="296165" y="2705392"/>
               </a:lnTo>
             </a:path>
           </a:pathLst>
@@ -3227,8 +3229,8 @@
       </dsp:nvSpPr>
       <dsp:spPr>
         <a:xfrm>
-          <a:off x="525389" y="3124883"/>
-          <a:ext cx="1342836" cy="839272"/>
+          <a:off x="1782831" y="3125358"/>
+          <a:ext cx="1343891" cy="839932"/>
         </a:xfrm>
         <a:prstGeom prst="roundRect">
           <a:avLst>
@@ -3294,8 +3296,8 @@
         </a:p>
       </dsp:txBody>
       <dsp:txXfrm>
-        <a:off x="549970" y="3149464"/>
-        <a:ext cx="1293674" cy="790110"/>
+        <a:off x="1807432" y="3149959"/>
+        <a:ext cx="1294689" cy="790730"/>
       </dsp:txXfrm>
     </dsp:sp>
     <dsp:sp modelId="{791D703C-F533-4BAF-BDE8-DD51435A86B4}">
@@ -3305,8 +3307,8 @@
       </dsp:nvSpPr>
       <dsp:spPr>
         <a:xfrm>
-          <a:off x="318542" y="839475"/>
-          <a:ext cx="205464" cy="3781444"/>
+          <a:off x="1486666" y="839932"/>
+          <a:ext cx="294780" cy="3780660"/>
         </a:xfrm>
         <a:custGeom>
           <a:avLst/>
@@ -3320,10 +3322,10 @@
                 <a:pt x="0" y="0"/>
               </a:moveTo>
               <a:lnTo>
-                <a:pt x="0" y="3781444"/>
+                <a:pt x="0" y="3780660"/>
               </a:lnTo>
               <a:lnTo>
-                <a:pt x="205464" y="3781444"/>
+                <a:pt x="294780" y="3780660"/>
               </a:lnTo>
             </a:path>
           </a:pathLst>
@@ -3363,8 +3365,8 @@
       </dsp:nvSpPr>
       <dsp:spPr>
         <a:xfrm>
-          <a:off x="524006" y="4201284"/>
-          <a:ext cx="1342836" cy="839272"/>
+          <a:off x="1781447" y="4200626"/>
+          <a:ext cx="1343891" cy="839932"/>
         </a:xfrm>
         <a:prstGeom prst="roundRect">
           <a:avLst>
@@ -3430,8 +3432,8 @@
         </a:p>
       </dsp:txBody>
       <dsp:txXfrm>
-        <a:off x="548587" y="4225865"/>
-        <a:ext cx="1293674" cy="790110"/>
+        <a:off x="1806048" y="4225227"/>
+        <a:ext cx="1294689" cy="790730"/>
       </dsp:txXfrm>
     </dsp:sp>
     <dsp:sp modelId="{2A66DC7D-BDF3-4751-A4D3-67EB48BAAC5F}">
@@ -3441,8 +3443,8 @@
       </dsp:nvSpPr>
       <dsp:spPr>
         <a:xfrm>
-          <a:off x="4151022" y="2460"/>
-          <a:ext cx="3223899" cy="839272"/>
+          <a:off x="5411311" y="482"/>
+          <a:ext cx="3226431" cy="839932"/>
         </a:xfrm>
         <a:prstGeom prst="roundRect">
           <a:avLst>
@@ -3513,8 +3515,8 @@
         </a:p>
       </dsp:txBody>
       <dsp:txXfrm>
-        <a:off x="4175603" y="27041"/>
-        <a:ext cx="3174737" cy="790110"/>
+        <a:off x="5435912" y="25083"/>
+        <a:ext cx="3177229" cy="790730"/>
       </dsp:txXfrm>
     </dsp:sp>
     <dsp:sp modelId="{0B6E15B1-D3C4-4A12-B25D-F82ADEC64178}">
@@ -3524,8 +3526,8 @@
       </dsp:nvSpPr>
       <dsp:spPr>
         <a:xfrm>
-          <a:off x="4473412" y="841733"/>
-          <a:ext cx="322389" cy="629454"/>
+          <a:off x="5733954" y="840415"/>
+          <a:ext cx="322643" cy="629949"/>
         </a:xfrm>
         <a:custGeom>
           <a:avLst/>
@@ -3539,10 +3541,10 @@
                 <a:pt x="0" y="0"/>
               </a:moveTo>
               <a:lnTo>
-                <a:pt x="0" y="629454"/>
+                <a:pt x="0" y="629949"/>
               </a:lnTo>
               <a:lnTo>
-                <a:pt x="322389" y="629454"/>
+                <a:pt x="322643" y="629949"/>
               </a:lnTo>
             </a:path>
           </a:pathLst>
@@ -3582,8 +3584,8 @@
       </dsp:nvSpPr>
       <dsp:spPr>
         <a:xfrm>
-          <a:off x="4795801" y="1051551"/>
-          <a:ext cx="1342836" cy="839272"/>
+          <a:off x="6056598" y="1050398"/>
+          <a:ext cx="1343891" cy="839932"/>
         </a:xfrm>
         <a:prstGeom prst="roundRect">
           <a:avLst>
@@ -3658,8 +3660,8 @@
         </a:p>
       </dsp:txBody>
       <dsp:txXfrm>
-        <a:off x="4820382" y="1076132"/>
-        <a:ext cx="1293674" cy="790110"/>
+        <a:off x="6081199" y="1074999"/>
+        <a:ext cx="1294689" cy="790730"/>
       </dsp:txXfrm>
     </dsp:sp>
     <dsp:sp modelId="{7E23E5B5-1E1E-49B5-BFA5-9B1ACC15D04D}">
@@ -3669,8 +3671,8 @@
       </dsp:nvSpPr>
       <dsp:spPr>
         <a:xfrm>
-          <a:off x="4473412" y="841733"/>
-          <a:ext cx="322389" cy="1678545"/>
+          <a:off x="5733954" y="840415"/>
+          <a:ext cx="322643" cy="1679864"/>
         </a:xfrm>
         <a:custGeom>
           <a:avLst/>
@@ -3684,10 +3686,10 @@
                 <a:pt x="0" y="0"/>
               </a:moveTo>
               <a:lnTo>
-                <a:pt x="0" y="1678545"/>
+                <a:pt x="0" y="1679864"/>
               </a:lnTo>
               <a:lnTo>
-                <a:pt x="322389" y="1678545"/>
+                <a:pt x="322643" y="1679864"/>
               </a:lnTo>
             </a:path>
           </a:pathLst>
@@ -3727,8 +3729,8 @@
       </dsp:nvSpPr>
       <dsp:spPr>
         <a:xfrm>
-          <a:off x="4795801" y="2100643"/>
-          <a:ext cx="1342836" cy="839272"/>
+          <a:off x="6056598" y="2100313"/>
+          <a:ext cx="1343891" cy="839932"/>
         </a:xfrm>
         <a:prstGeom prst="roundRect">
           <a:avLst>
@@ -3794,8 +3796,8 @@
         </a:p>
       </dsp:txBody>
       <dsp:txXfrm>
-        <a:off x="4820382" y="2125224"/>
-        <a:ext cx="1293674" cy="790110"/>
+        <a:off x="6081199" y="2124914"/>
+        <a:ext cx="1294689" cy="790730"/>
       </dsp:txXfrm>
     </dsp:sp>
     <dsp:sp modelId="{87930022-88E2-4A7E-ACFE-72E10DAC527A}">
@@ -3805,8 +3807,8 @@
       </dsp:nvSpPr>
       <dsp:spPr>
         <a:xfrm>
-          <a:off x="4473412" y="841733"/>
-          <a:ext cx="322389" cy="2727637"/>
+          <a:off x="5733954" y="840415"/>
+          <a:ext cx="322643" cy="2729779"/>
         </a:xfrm>
         <a:custGeom>
           <a:avLst/>
@@ -3820,10 +3822,10 @@
                 <a:pt x="0" y="0"/>
               </a:moveTo>
               <a:lnTo>
-                <a:pt x="0" y="2727637"/>
+                <a:pt x="0" y="2729779"/>
               </a:lnTo>
               <a:lnTo>
-                <a:pt x="322389" y="2727637"/>
+                <a:pt x="322643" y="2729779"/>
               </a:lnTo>
             </a:path>
           </a:pathLst>
@@ -3863,8 +3865,8 @@
       </dsp:nvSpPr>
       <dsp:spPr>
         <a:xfrm>
-          <a:off x="4795801" y="3149734"/>
-          <a:ext cx="1342836" cy="839272"/>
+          <a:off x="6056598" y="3150228"/>
+          <a:ext cx="1343891" cy="839932"/>
         </a:xfrm>
         <a:prstGeom prst="roundRect">
           <a:avLst>
@@ -3934,8 +3936,8 @@
         </a:p>
       </dsp:txBody>
       <dsp:txXfrm>
-        <a:off x="4820382" y="3174315"/>
-        <a:ext cx="1293674" cy="790110"/>
+        <a:off x="6081199" y="3174829"/>
+        <a:ext cx="1294689" cy="790730"/>
       </dsp:txXfrm>
     </dsp:sp>
     <dsp:sp modelId="{841635B0-FB7E-4A9A-A2CC-233E088B1FF5}">
@@ -3945,8 +3947,8 @@
       </dsp:nvSpPr>
       <dsp:spPr>
         <a:xfrm>
-          <a:off x="4473412" y="841733"/>
-          <a:ext cx="322389" cy="3776728"/>
+          <a:off x="5733954" y="840415"/>
+          <a:ext cx="322643" cy="3779694"/>
         </a:xfrm>
         <a:custGeom>
           <a:avLst/>
@@ -3960,10 +3962,10 @@
                 <a:pt x="0" y="0"/>
               </a:moveTo>
               <a:lnTo>
-                <a:pt x="0" y="3776728"/>
+                <a:pt x="0" y="3779694"/>
               </a:lnTo>
               <a:lnTo>
-                <a:pt x="322389" y="3776728"/>
+                <a:pt x="322643" y="3779694"/>
               </a:lnTo>
             </a:path>
           </a:pathLst>
@@ -4003,8 +4005,8 @@
       </dsp:nvSpPr>
       <dsp:spPr>
         <a:xfrm>
-          <a:off x="4795801" y="4198825"/>
-          <a:ext cx="1342836" cy="839272"/>
+          <a:off x="6056598" y="4200143"/>
+          <a:ext cx="1343891" cy="839932"/>
         </a:xfrm>
         <a:prstGeom prst="roundRect">
           <a:avLst>
@@ -4070,8 +4072,8 @@
         </a:p>
       </dsp:txBody>
       <dsp:txXfrm>
-        <a:off x="4820382" y="4223406"/>
-        <a:ext cx="1293674" cy="790110"/>
+        <a:off x="6081199" y="4224744"/>
+        <a:ext cx="1294689" cy="790730"/>
       </dsp:txXfrm>
     </dsp:sp>
   </dsp:spTree>
@@ -7340,7 +7342,7 @@
             <a:fld id="{A32DC80D-291A-4ABB-A78B-0417274A267C}" type="datetime4">
               <a:rPr lang="de-DE"/>
               <a:pPr/>
-              <a:t>7. Juli 2023</a:t>
+              <a:t>10. Juli 2023</a:t>
             </a:fld>
             <a:endParaRPr lang="de-DE"/>
           </a:p>
@@ -7731,7 +7733,7 @@
             <a:fld id="{065B079B-E513-489A-8A1B-D7C78493EA86}" type="datetime4">
               <a:rPr lang="de-DE"/>
               <a:pPr/>
-              <a:t>7. Juli 2023</a:t>
+              <a:t>10. Juli 2023</a:t>
             </a:fld>
             <a:endParaRPr lang="de-DE"/>
           </a:p>
@@ -8796,6 +8798,284 @@
     <p:extLst>
       <p:ext uri="{BB962C8B-B14F-4D97-AF65-F5344CB8AC3E}">
         <p14:creationId xmlns:p14="http://schemas.microsoft.com/office/powerpoint/2010/main" val="4632563"/>
+      </p:ext>
+    </p:extLst>
+  </p:cSld>
+  <p:clrMapOvr>
+    <a:masterClrMapping/>
+  </p:clrMapOvr>
+</p:notes>
+</file>
+
+<file path=ppt/notesSlides/notesSlide2.xml><?xml version="1.0" encoding="utf-8"?>
+<p:notes xmlns:a="http://schemas.openxmlformats.org/drawingml/2006/main" xmlns:r="http://schemas.openxmlformats.org/officeDocument/2006/relationships" xmlns:p="http://schemas.openxmlformats.org/presentationml/2006/main">
+  <p:cSld>
+    <p:spTree>
+      <p:nvGrpSpPr>
+        <p:cNvPr id="1" name=""/>
+        <p:cNvGrpSpPr/>
+        <p:nvPr/>
+      </p:nvGrpSpPr>
+      <p:grpSpPr>
+        <a:xfrm>
+          <a:off x="0" y="0"/>
+          <a:ext cx="0" cy="0"/>
+          <a:chOff x="0" y="0"/>
+          <a:chExt cx="0" cy="0"/>
+        </a:xfrm>
+      </p:grpSpPr>
+      <p:sp>
+        <p:nvSpPr>
+          <p:cNvPr id="2" name="Folienbildplatzhalter 1"/>
+          <p:cNvSpPr>
+            <a:spLocks noGrp="1" noRot="1" noChangeAspect="1"/>
+          </p:cNvSpPr>
+          <p:nvPr>
+            <p:ph type="sldImg"/>
+          </p:nvPr>
+        </p:nvSpPr>
+        <p:spPr/>
+      </p:sp>
+      <p:sp>
+        <p:nvSpPr>
+          <p:cNvPr id="3" name="Notizenplatzhalter 2"/>
+          <p:cNvSpPr>
+            <a:spLocks noGrp="1"/>
+          </p:cNvSpPr>
+          <p:nvPr>
+            <p:ph type="body" idx="1"/>
+          </p:nvPr>
+        </p:nvSpPr>
+        <p:spPr/>
+        <p:txBody>
+          <a:bodyPr/>
+          <a:lstStyle/>
+          <a:p>
+            <a:r>
+              <a:rPr lang="de-DE" dirty="0"/>
+              <a:t>TODO: legende </a:t>
+            </a:r>
+            <a:r>
+              <a:rPr lang="de-DE" dirty="0" err="1"/>
+              <a:t>graph</a:t>
+            </a:r>
+            <a:endParaRPr lang="de-DE" dirty="0"/>
+          </a:p>
+        </p:txBody>
+      </p:sp>
+      <p:sp>
+        <p:nvSpPr>
+          <p:cNvPr id="4" name="Datumsplatzhalter 3"/>
+          <p:cNvSpPr>
+            <a:spLocks noGrp="1"/>
+          </p:cNvSpPr>
+          <p:nvPr>
+            <p:ph type="dt" idx="1"/>
+          </p:nvPr>
+        </p:nvSpPr>
+        <p:spPr/>
+        <p:txBody>
+          <a:bodyPr/>
+          <a:lstStyle/>
+          <a:p>
+            <a:fld id="{065B079B-E513-489A-8A1B-D7C78493EA86}" type="datetime4">
+              <a:rPr lang="de-DE" smtClean="0"/>
+              <a:pPr/>
+              <a:t>11. Juli 2023</a:t>
+            </a:fld>
+            <a:endParaRPr lang="de-DE"/>
+          </a:p>
+        </p:txBody>
+      </p:sp>
+      <p:sp>
+        <p:nvSpPr>
+          <p:cNvPr id="5" name="Fußzeilenplatzhalter 4"/>
+          <p:cNvSpPr>
+            <a:spLocks noGrp="1"/>
+          </p:cNvSpPr>
+          <p:nvPr>
+            <p:ph type="ftr" sz="quarter" idx="4"/>
+          </p:nvPr>
+        </p:nvSpPr>
+        <p:spPr/>
+        <p:txBody>
+          <a:bodyPr/>
+          <a:lstStyle/>
+          <a:p>
+            <a:r>
+              <a:rPr lang="de-DE"/>
+              <a:t>|  </a:t>
+            </a:r>
+          </a:p>
+        </p:txBody>
+      </p:sp>
+      <p:sp>
+        <p:nvSpPr>
+          <p:cNvPr id="6" name="Foliennummernplatzhalter 5"/>
+          <p:cNvSpPr>
+            <a:spLocks noGrp="1"/>
+          </p:cNvSpPr>
+          <p:nvPr>
+            <p:ph type="sldNum" sz="quarter" idx="5"/>
+          </p:nvPr>
+        </p:nvSpPr>
+        <p:spPr/>
+        <p:txBody>
+          <a:bodyPr/>
+          <a:lstStyle/>
+          <a:p>
+            <a:r>
+              <a:rPr lang="de-DE"/>
+              <a:t>|  </a:t>
+            </a:r>
+            <a:fld id="{C36AA9A4-5D0B-4134-89A6-D8B9DAA4F25C}" type="slidenum">
+              <a:rPr lang="de-DE" smtClean="0"/>
+              <a:pPr/>
+              <a:t>10</a:t>
+            </a:fld>
+            <a:endParaRPr lang="de-DE"/>
+          </a:p>
+        </p:txBody>
+      </p:sp>
+    </p:spTree>
+    <p:extLst>
+      <p:ext uri="{BB962C8B-B14F-4D97-AF65-F5344CB8AC3E}">
+        <p14:creationId xmlns:p14="http://schemas.microsoft.com/office/powerpoint/2010/main" val="1408273292"/>
+      </p:ext>
+    </p:extLst>
+  </p:cSld>
+  <p:clrMapOvr>
+    <a:masterClrMapping/>
+  </p:clrMapOvr>
+</p:notes>
+</file>
+
+<file path=ppt/notesSlides/notesSlide3.xml><?xml version="1.0" encoding="utf-8"?>
+<p:notes xmlns:a="http://schemas.openxmlformats.org/drawingml/2006/main" xmlns:r="http://schemas.openxmlformats.org/officeDocument/2006/relationships" xmlns:p="http://schemas.openxmlformats.org/presentationml/2006/main">
+  <p:cSld>
+    <p:spTree>
+      <p:nvGrpSpPr>
+        <p:cNvPr id="1" name=""/>
+        <p:cNvGrpSpPr/>
+        <p:nvPr/>
+      </p:nvGrpSpPr>
+      <p:grpSpPr>
+        <a:xfrm>
+          <a:off x="0" y="0"/>
+          <a:ext cx="0" cy="0"/>
+          <a:chOff x="0" y="0"/>
+          <a:chExt cx="0" cy="0"/>
+        </a:xfrm>
+      </p:grpSpPr>
+      <p:sp>
+        <p:nvSpPr>
+          <p:cNvPr id="2" name="Folienbildplatzhalter 1"/>
+          <p:cNvSpPr>
+            <a:spLocks noGrp="1" noRot="1" noChangeAspect="1"/>
+          </p:cNvSpPr>
+          <p:nvPr>
+            <p:ph type="sldImg"/>
+          </p:nvPr>
+        </p:nvSpPr>
+        <p:spPr/>
+      </p:sp>
+      <p:sp>
+        <p:nvSpPr>
+          <p:cNvPr id="3" name="Notizenplatzhalter 2"/>
+          <p:cNvSpPr>
+            <a:spLocks noGrp="1"/>
+          </p:cNvSpPr>
+          <p:nvPr>
+            <p:ph type="body" idx="1"/>
+          </p:nvPr>
+        </p:nvSpPr>
+        <p:spPr/>
+        <p:txBody>
+          <a:bodyPr/>
+          <a:lstStyle/>
+          <a:p>
+            <a:endParaRPr lang="de-DE" dirty="0"/>
+          </a:p>
+        </p:txBody>
+      </p:sp>
+      <p:sp>
+        <p:nvSpPr>
+          <p:cNvPr id="4" name="Datumsplatzhalter 3"/>
+          <p:cNvSpPr>
+            <a:spLocks noGrp="1"/>
+          </p:cNvSpPr>
+          <p:nvPr>
+            <p:ph type="dt" idx="1"/>
+          </p:nvPr>
+        </p:nvSpPr>
+        <p:spPr/>
+        <p:txBody>
+          <a:bodyPr/>
+          <a:lstStyle/>
+          <a:p>
+            <a:fld id="{065B079B-E513-489A-8A1B-D7C78493EA86}" type="datetime4">
+              <a:rPr lang="de-DE" smtClean="0"/>
+              <a:pPr/>
+              <a:t>11. Juli 2023</a:t>
+            </a:fld>
+            <a:endParaRPr lang="de-DE"/>
+          </a:p>
+        </p:txBody>
+      </p:sp>
+      <p:sp>
+        <p:nvSpPr>
+          <p:cNvPr id="5" name="Fußzeilenplatzhalter 4"/>
+          <p:cNvSpPr>
+            <a:spLocks noGrp="1"/>
+          </p:cNvSpPr>
+          <p:nvPr>
+            <p:ph type="ftr" sz="quarter" idx="4"/>
+          </p:nvPr>
+        </p:nvSpPr>
+        <p:spPr/>
+        <p:txBody>
+          <a:bodyPr/>
+          <a:lstStyle/>
+          <a:p>
+            <a:r>
+              <a:rPr lang="de-DE"/>
+              <a:t>|  </a:t>
+            </a:r>
+          </a:p>
+        </p:txBody>
+      </p:sp>
+      <p:sp>
+        <p:nvSpPr>
+          <p:cNvPr id="6" name="Foliennummernplatzhalter 5"/>
+          <p:cNvSpPr>
+            <a:spLocks noGrp="1"/>
+          </p:cNvSpPr>
+          <p:nvPr>
+            <p:ph type="sldNum" sz="quarter" idx="5"/>
+          </p:nvPr>
+        </p:nvSpPr>
+        <p:spPr/>
+        <p:txBody>
+          <a:bodyPr/>
+          <a:lstStyle/>
+          <a:p>
+            <a:r>
+              <a:rPr lang="de-DE"/>
+              <a:t>|  </a:t>
+            </a:r>
+            <a:fld id="{C36AA9A4-5D0B-4134-89A6-D8B9DAA4F25C}" type="slidenum">
+              <a:rPr lang="de-DE" smtClean="0"/>
+              <a:pPr/>
+              <a:t>11</a:t>
+            </a:fld>
+            <a:endParaRPr lang="de-DE"/>
+          </a:p>
+        </p:txBody>
+      </p:sp>
+    </p:spTree>
+    <p:extLst>
+      <p:ext uri="{BB962C8B-B14F-4D97-AF65-F5344CB8AC3E}">
+        <p14:creationId xmlns:p14="http://schemas.microsoft.com/office/powerpoint/2010/main" val="1417826392"/>
       </p:ext>
     </p:extLst>
   </p:cSld>
@@ -11172,7 +11452,7 @@
             </a:pPr>
             <a:r>
               <a:rPr lang="en-US" dirty="0"/>
-              <a:t>Modeling and Analysis of Human Behavior Impacts on Energy Systems during Crisis Events</a:t>
+              <a:t>Modelling and Analysis of Human Behavior Impacts on Energy Systems during Crisis Events</a:t>
             </a:r>
           </a:p>
         </p:txBody>
@@ -11212,6 +11492,253 @@
           <p:cNvPr id="2" name="Titel 1">
             <a:extLst>
               <a:ext uri="{FF2B5EF4-FFF2-40B4-BE49-F238E27FC236}">
+                <a16:creationId xmlns:a16="http://schemas.microsoft.com/office/drawing/2014/main" id="{676B06DE-4337-3584-9F8E-460629089865}"/>
+              </a:ext>
+            </a:extLst>
+          </p:cNvPr>
+          <p:cNvSpPr>
+            <a:spLocks noGrp="1"/>
+          </p:cNvSpPr>
+          <p:nvPr>
+            <p:ph type="title"/>
+          </p:nvPr>
+        </p:nvSpPr>
+        <p:spPr/>
+        <p:txBody>
+          <a:bodyPr/>
+          <a:lstStyle/>
+          <a:p>
+            <a:r>
+              <a:rPr lang="de-DE" dirty="0"/>
+              <a:t>First Look </a:t>
+            </a:r>
+            <a:r>
+              <a:rPr lang="de-DE" dirty="0" err="1"/>
+              <a:t>into</a:t>
+            </a:r>
+            <a:r>
+              <a:rPr lang="de-DE" dirty="0"/>
+              <a:t> </a:t>
+            </a:r>
+            <a:r>
+              <a:rPr lang="de-DE" dirty="0" err="1"/>
+              <a:t>the</a:t>
+            </a:r>
+            <a:r>
+              <a:rPr lang="de-DE" dirty="0"/>
+              <a:t> Simulator</a:t>
+            </a:r>
+          </a:p>
+        </p:txBody>
+      </p:sp>
+      <p:pic>
+        <p:nvPicPr>
+          <p:cNvPr id="4" name="video">
+            <a:hlinkClick r:id="" action="ppaction://media"/>
+            <a:extLst>
+              <a:ext uri="{FF2B5EF4-FFF2-40B4-BE49-F238E27FC236}">
+                <a16:creationId xmlns:a16="http://schemas.microsoft.com/office/drawing/2014/main" id="{C5136FEA-44A6-7534-BFC4-EC1A5997D9D8}"/>
+              </a:ext>
+            </a:extLst>
+          </p:cNvPr>
+          <p:cNvPicPr>
+            <a:picLocks noGrp="1" noChangeAspect="1"/>
+          </p:cNvPicPr>
+          <p:nvPr>
+            <p:ph idx="1"/>
+            <a:videoFile r:link="rId1"/>
+            <p:extLst>
+              <p:ext uri="{DAA4B4D4-6D71-4841-9C94-3DE7FCFB9230}">
+                <p14:media xmlns:p14="http://schemas.microsoft.com/office/powerpoint/2010/main" r:embed="rId2">
+                  <p14:trim end="6000"/>
+                </p14:media>
+              </p:ext>
+            </p:extLst>
+          </p:nvPr>
+        </p:nvPicPr>
+        <p:blipFill>
+          <a:blip r:embed="rId5"/>
+          <a:stretch>
+            <a:fillRect/>
+          </a:stretch>
+        </p:blipFill>
+        <p:spPr>
+          <a:xfrm>
+            <a:off x="625475" y="1484784"/>
+            <a:ext cx="10942638" cy="4689475"/>
+          </a:xfrm>
+        </p:spPr>
+      </p:pic>
+    </p:spTree>
+    <p:extLst>
+      <p:ext uri="{BB962C8B-B14F-4D97-AF65-F5344CB8AC3E}">
+        <p14:creationId xmlns:p14="http://schemas.microsoft.com/office/powerpoint/2010/main" val="3107658118"/>
+      </p:ext>
+    </p:extLst>
+  </p:cSld>
+  <p:clrMapOvr>
+    <a:masterClrMapping/>
+  </p:clrMapOvr>
+  <p:timing>
+    <p:tnLst>
+      <p:par>
+        <p:cTn id="1" dur="indefinite" restart="never" nodeType="tmRoot">
+          <p:childTnLst>
+            <p:seq concurrent="1" nextAc="seek">
+              <p:cTn id="2" dur="indefinite" nodeType="mainSeq">
+                <p:childTnLst>
+                  <p:par>
+                    <p:cTn id="3" fill="hold">
+                      <p:stCondLst>
+                        <p:cond delay="indefinite"/>
+                      </p:stCondLst>
+                      <p:childTnLst>
+                        <p:par>
+                          <p:cTn id="4" fill="hold">
+                            <p:stCondLst>
+                              <p:cond delay="0"/>
+                            </p:stCondLst>
+                            <p:childTnLst>
+                              <p:par>
+                                <p:cTn id="5" presetID="1" presetClass="mediacall" presetSubtype="0" fill="hold" nodeType="clickEffect">
+                                  <p:stCondLst>
+                                    <p:cond delay="0"/>
+                                  </p:stCondLst>
+                                  <p:childTnLst>
+                                    <p:cmd type="call" cmd="playFrom(0.0)">
+                                      <p:cBhvr>
+                                        <p:cTn id="6" dur="14000" fill="hold"/>
+                                        <p:tgtEl>
+                                          <p:spTgt spid="4"/>
+                                        </p:tgtEl>
+                                      </p:cBhvr>
+                                    </p:cmd>
+                                  </p:childTnLst>
+                                </p:cTn>
+                              </p:par>
+                            </p:childTnLst>
+                          </p:cTn>
+                        </p:par>
+                      </p:childTnLst>
+                    </p:cTn>
+                  </p:par>
+                </p:childTnLst>
+              </p:cTn>
+              <p:prevCondLst>
+                <p:cond evt="onPrev" delay="0">
+                  <p:tgtEl>
+                    <p:sldTgt/>
+                  </p:tgtEl>
+                </p:cond>
+              </p:prevCondLst>
+              <p:nextCondLst>
+                <p:cond evt="onNext" delay="0">
+                  <p:tgtEl>
+                    <p:sldTgt/>
+                  </p:tgtEl>
+                </p:cond>
+              </p:nextCondLst>
+            </p:seq>
+            <p:video>
+              <p:cMediaNode vol="80000">
+                <p:cTn id="7" fill="hold" display="0">
+                  <p:stCondLst>
+                    <p:cond delay="indefinite"/>
+                  </p:stCondLst>
+                </p:cTn>
+                <p:tgtEl>
+                  <p:spTgt spid="4"/>
+                </p:tgtEl>
+              </p:cMediaNode>
+            </p:video>
+            <p:seq concurrent="1" nextAc="seek">
+              <p:cTn id="8" restart="whenNotActive" fill="hold" evtFilter="cancelBubble" nodeType="interactiveSeq">
+                <p:stCondLst>
+                  <p:cond evt="onClick" delay="0">
+                    <p:tgtEl>
+                      <p:spTgt spid="4"/>
+                    </p:tgtEl>
+                  </p:cond>
+                </p:stCondLst>
+                <p:endSync evt="end" delay="0">
+                  <p:rtn val="all"/>
+                </p:endSync>
+                <p:childTnLst>
+                  <p:par>
+                    <p:cTn id="9" fill="hold">
+                      <p:stCondLst>
+                        <p:cond delay="0"/>
+                      </p:stCondLst>
+                      <p:childTnLst>
+                        <p:par>
+                          <p:cTn id="10" fill="hold">
+                            <p:stCondLst>
+                              <p:cond delay="0"/>
+                            </p:stCondLst>
+                            <p:childTnLst>
+                              <p:par>
+                                <p:cTn id="11" presetID="2" presetClass="mediacall" presetSubtype="0" fill="hold" nodeType="clickEffect">
+                                  <p:stCondLst>
+                                    <p:cond delay="0"/>
+                                  </p:stCondLst>
+                                  <p:childTnLst>
+                                    <p:cmd type="call" cmd="togglePause">
+                                      <p:cBhvr>
+                                        <p:cTn id="12" dur="1" fill="hold"/>
+                                        <p:tgtEl>
+                                          <p:spTgt spid="4"/>
+                                        </p:tgtEl>
+                                      </p:cBhvr>
+                                    </p:cmd>
+                                  </p:childTnLst>
+                                </p:cTn>
+                              </p:par>
+                            </p:childTnLst>
+                          </p:cTn>
+                        </p:par>
+                      </p:childTnLst>
+                    </p:cTn>
+                  </p:par>
+                </p:childTnLst>
+              </p:cTn>
+              <p:nextCondLst>
+                <p:cond evt="onClick" delay="0">
+                  <p:tgtEl>
+                    <p:spTgt spid="4"/>
+                  </p:tgtEl>
+                </p:cond>
+              </p:nextCondLst>
+            </p:seq>
+          </p:childTnLst>
+        </p:cTn>
+      </p:par>
+    </p:tnLst>
+  </p:timing>
+</p:sld>
+</file>
+
+<file path=ppt/slides/slide11.xml><?xml version="1.0" encoding="utf-8"?>
+<p:sld xmlns:a="http://schemas.openxmlformats.org/drawingml/2006/main" xmlns:r="http://schemas.openxmlformats.org/officeDocument/2006/relationships" xmlns:p="http://schemas.openxmlformats.org/presentationml/2006/main">
+  <p:cSld>
+    <p:spTree>
+      <p:nvGrpSpPr>
+        <p:cNvPr id="1" name=""/>
+        <p:cNvGrpSpPr/>
+        <p:nvPr/>
+      </p:nvGrpSpPr>
+      <p:grpSpPr>
+        <a:xfrm>
+          <a:off x="0" y="0"/>
+          <a:ext cx="0" cy="0"/>
+          <a:chOff x="0" y="0"/>
+          <a:chExt cx="0" cy="0"/>
+        </a:xfrm>
+      </p:grpSpPr>
+      <p:sp>
+        <p:nvSpPr>
+          <p:cNvPr id="2" name="Titel 1">
+            <a:extLst>
+              <a:ext uri="{FF2B5EF4-FFF2-40B4-BE49-F238E27FC236}">
                 <a16:creationId xmlns:a16="http://schemas.microsoft.com/office/drawing/2014/main" id="{78EEF76A-CBED-CC75-7EBE-49938DFBDC26}"/>
               </a:ext>
             </a:extLst>
@@ -11293,18 +11820,18 @@
           <p:nvPr>
             <p:extLst>
               <p:ext uri="{D42A27DB-BD31-4B8C-83A1-F6EECF244321}">
-                <p14:modId xmlns:p14="http://schemas.microsoft.com/office/powerpoint/2010/main" val="4042500959"/>
+                <p14:modId xmlns:p14="http://schemas.microsoft.com/office/powerpoint/2010/main" val="1664303978"/>
               </p:ext>
             </p:extLst>
           </p:nvPr>
         </p:nvGraphicFramePr>
         <p:xfrm>
-          <a:off x="2351584" y="1628800"/>
-          <a:ext cx="7920880" cy="5040559"/>
+          <a:off x="911424" y="1628800"/>
+          <a:ext cx="10441160" cy="5040559"/>
         </p:xfrm>
         <a:graphic>
           <a:graphicData uri="http://schemas.openxmlformats.org/drawingml/2006/diagram">
-            <dgm:relIds xmlns:dgm="http://schemas.openxmlformats.org/drawingml/2006/diagram" xmlns:r="http://schemas.openxmlformats.org/officeDocument/2006/relationships" r:dm="rId2" r:lo="rId3" r:qs="rId4" r:cs="rId5"/>
+            <dgm:relIds xmlns:dgm="http://schemas.openxmlformats.org/drawingml/2006/diagram" xmlns:r="http://schemas.openxmlformats.org/officeDocument/2006/relationships" r:dm="rId3" r:lo="rId4" r:qs="rId5" r:cs="rId6"/>
           </a:graphicData>
         </a:graphic>
       </p:graphicFrame>
@@ -11321,7 +11848,7 @@
 </p:sld>
 </file>
 
-<file path=ppt/slides/slide11.xml><?xml version="1.0" encoding="utf-8"?>
+<file path=ppt/slides/slide12.xml><?xml version="1.0" encoding="utf-8"?>
 <p:sld xmlns:a="http://schemas.openxmlformats.org/drawingml/2006/main" xmlns:r="http://schemas.openxmlformats.org/officeDocument/2006/relationships" xmlns:p="http://schemas.openxmlformats.org/presentationml/2006/main">
   <p:cSld>
     <p:spTree>
@@ -11413,7 +11940,15 @@
             <a:pPr algn="ctr"/>
             <a:r>
               <a:rPr lang="de-DE" dirty="0"/>
-              <a:t>Power Demand </a:t>
+              <a:t>Power </a:t>
+            </a:r>
+            <a:r>
+              <a:rPr lang="de-DE" dirty="0" err="1"/>
+              <a:t>demand</a:t>
+            </a:r>
+            <a:r>
+              <a:rPr lang="de-DE" dirty="0"/>
+              <a:t> </a:t>
             </a:r>
             <a:r>
               <a:rPr lang="de-DE" dirty="0" err="1"/>
@@ -11429,7 +11964,7 @@
             </a:r>
             <a:r>
               <a:rPr lang="de-DE" dirty="0"/>
-              <a:t> Variables </a:t>
+              <a:t> variables </a:t>
             </a:r>
             <a:r>
               <a:rPr lang="de-DE" dirty="0" err="1"/>
@@ -11437,11 +11972,11 @@
             </a:r>
             <a:r>
               <a:rPr lang="de-DE" dirty="0"/>
-              <a:t> on Human </a:t>
+              <a:t> on human </a:t>
             </a:r>
             <a:r>
               <a:rPr lang="de-DE" dirty="0" err="1"/>
-              <a:t>Behavior</a:t>
+              <a:t>behavior</a:t>
             </a:r>
             <a:endParaRPr lang="de-DE" dirty="0"/>
           </a:p>
@@ -11553,7 +12088,7 @@
             </a:r>
             <a:r>
               <a:rPr lang="de-DE" dirty="0"/>
-              <a:t> Variables </a:t>
+              <a:t> variables </a:t>
             </a:r>
             <a:r>
               <a:rPr lang="de-DE" dirty="0" err="1"/>
@@ -11561,7 +12096,15 @@
             </a:r>
             <a:r>
               <a:rPr lang="de-DE" dirty="0"/>
-              <a:t> Inputs </a:t>
+              <a:t> </a:t>
+            </a:r>
+            <a:r>
+              <a:rPr lang="de-DE" dirty="0" err="1"/>
+              <a:t>inputs</a:t>
+            </a:r>
+            <a:r>
+              <a:rPr lang="de-DE" dirty="0"/>
+              <a:t> </a:t>
             </a:r>
             <a:r>
               <a:rPr lang="de-DE" dirty="0" err="1"/>
@@ -11577,7 +12120,15 @@
             </a:r>
             <a:r>
               <a:rPr lang="de-DE" dirty="0"/>
-              <a:t> Power Demand </a:t>
+              <a:t> power </a:t>
+            </a:r>
+            <a:r>
+              <a:rPr lang="de-DE" dirty="0" err="1"/>
+              <a:t>demand</a:t>
+            </a:r>
+            <a:r>
+              <a:rPr lang="de-DE" dirty="0"/>
+              <a:t> </a:t>
             </a:r>
             <a:r>
               <a:rPr lang="de-DE" dirty="0" err="1"/>
@@ -11769,7 +12320,7 @@
 </p:sld>
 </file>
 
-<file path=ppt/slides/slide12.xml><?xml version="1.0" encoding="utf-8"?>
+<file path=ppt/slides/slide13.xml><?xml version="1.0" encoding="utf-8"?>
 <p:sld xmlns:a="http://schemas.openxmlformats.org/drawingml/2006/main" xmlns:r="http://schemas.openxmlformats.org/officeDocument/2006/relationships" xmlns:p="http://schemas.openxmlformats.org/presentationml/2006/main">
   <p:cSld>
     <p:spTree>
@@ -11802,14 +12353,19 @@
             <p:ph type="title"/>
           </p:nvPr>
         </p:nvSpPr>
-        <p:spPr/>
+        <p:spPr>
+          <a:xfrm>
+            <a:off x="478366" y="488950"/>
+            <a:ext cx="9506065" cy="838200"/>
+          </a:xfrm>
+        </p:spPr>
         <p:txBody>
           <a:bodyPr/>
           <a:lstStyle/>
           <a:p>
             <a:r>
               <a:rPr lang="en-US" dirty="0"/>
-              <a:t>These Variables could be used to create a monitoring Platform for possible Panic Buying Behavior for the Power Grid</a:t>
+              <a:t>These Variables could be used to create a monitoring Platform for Panic Buying Behavior for the Power Grid</a:t>
             </a:r>
           </a:p>
         </p:txBody>
@@ -12291,7 +12847,7 @@
 </p:sld>
 </file>
 
-<file path=ppt/slides/slide13.xml><?xml version="1.0" encoding="utf-8"?>
+<file path=ppt/slides/slide14.xml><?xml version="1.0" encoding="utf-8"?>
 <p:sld xmlns:a="http://schemas.openxmlformats.org/drawingml/2006/main" xmlns:r="http://schemas.openxmlformats.org/officeDocument/2006/relationships" xmlns:p="http://schemas.openxmlformats.org/presentationml/2006/main">
   <p:cSld>
     <p:spTree>
@@ -12380,7 +12936,7 @@
 </p:sld>
 </file>
 
-<file path=ppt/slides/slide14.xml><?xml version="1.0" encoding="utf-8"?>
+<file path=ppt/slides/slide15.xml><?xml version="1.0" encoding="utf-8"?>
 <p:sld xmlns:a="http://schemas.openxmlformats.org/drawingml/2006/main" xmlns:r="http://schemas.openxmlformats.org/officeDocument/2006/relationships" xmlns:p="http://schemas.openxmlformats.org/presentationml/2006/main">
   <p:cSld>
     <p:spTree>
@@ -12453,7 +13009,7 @@
 </p:sld>
 </file>
 
-<file path=ppt/slides/slide15.xml><?xml version="1.0" encoding="utf-8"?>
+<file path=ppt/slides/slide16.xml><?xml version="1.0" encoding="utf-8"?>
 <p:sld xmlns:a="http://schemas.openxmlformats.org/drawingml/2006/main" xmlns:r="http://schemas.openxmlformats.org/officeDocument/2006/relationships" xmlns:p="http://schemas.openxmlformats.org/presentationml/2006/main">
   <p:cSld>
     <p:spTree>
@@ -12521,7 +13077,57 @@
           <a:p>
             <a:r>
               <a:rPr lang="en-US" sz="1100" b="0" dirty="0"/>
-              <a:t>[1] </a:t>
+              <a:t>[1] Fisher, Marc. “Flushing out the true cause of the global toilet paper shortage amid coronavirus pandemic" The Washington Post, https://www.washingtonpost.com/national/coronavirus-toilet-paper-shortage-panic/2020/04/07/1fd30e92-75b5-11ea-87da-77a8136c1a6d_story.html, 2020, accessed on 07/07/2023</a:t>
+            </a:r>
+          </a:p>
+          <a:p>
+            <a:r>
+              <a:rPr lang="en-US" sz="1100" b="0" dirty="0"/>
+              <a:t>[2] </a:t>
+            </a:r>
+            <a:r>
+              <a:rPr lang="en-US" sz="1100" b="0" dirty="0" err="1"/>
+              <a:t>Stopera</a:t>
+            </a:r>
+            <a:r>
+              <a:rPr lang="en-US" sz="1100" b="0" dirty="0"/>
+              <a:t> , Matt. “14 Tweets That Show What The Coronavirus Toilet Paper Shortage Looks Like In Seattle" Buzzfeed, https://www.buzzfeed.com/mjs538/tweets-that-show-what-the-coronavirus-toilet-paper, 2020, accessed on 07/07/2023</a:t>
+            </a:r>
+          </a:p>
+          <a:p>
+            <a:pPr algn="l"/>
+            <a:r>
+              <a:rPr lang="en-US" sz="1100" b="0" dirty="0"/>
+              <a:t>[3] Alan </a:t>
+            </a:r>
+            <a:r>
+              <a:rPr lang="en-US" sz="1100" b="0" dirty="0" err="1"/>
+              <a:t>Mislove</a:t>
+            </a:r>
+            <a:r>
+              <a:rPr lang="en-US" sz="1100" b="0" dirty="0"/>
+              <a:t> et al. “Measurement and analysis of online social networks”. In: Proceedings of the 7thACM SIGCOMM conference on Internet measurement. 2007, pp. 29–42.</a:t>
+            </a:r>
+          </a:p>
+          <a:p>
+            <a:pPr algn="l"/>
+            <a:r>
+              <a:rPr lang="en-US" sz="1100" b="0" dirty="0"/>
+              <a:t>[4] Marcella </a:t>
+            </a:r>
+            <a:r>
+              <a:rPr lang="en-US" sz="1100" b="0" dirty="0" err="1"/>
+              <a:t>Tambuscio</a:t>
+            </a:r>
+            <a:r>
+              <a:rPr lang="en-US" sz="1100" b="0" dirty="0"/>
+              <a:t> et al. “Fact-checking effect on viral hoaxes: A model of misinformation spreading social networks”. In: Proceedings of the 24th international conference on World Wide Web. 2015,pp. 977–982.</a:t>
+            </a:r>
+          </a:p>
+          <a:p>
+            <a:r>
+              <a:rPr lang="en-US" sz="1100" b="0" dirty="0"/>
+              <a:t>[5] </a:t>
             </a:r>
             <a:r>
               <a:rPr lang="en-US" sz="1100" b="0" dirty="0" err="1"/>
@@ -12544,7 +13150,7 @@
             <a:pPr algn="l"/>
             <a:r>
               <a:rPr lang="en-US" sz="1100" b="0" dirty="0"/>
-              <a:t>[2] George, Alice L. </a:t>
+              <a:t>[6] George, Alice L. </a:t>
             </a:r>
             <a:r>
               <a:rPr lang="en-US" sz="1100" b="0" i="1" dirty="0"/>
@@ -12559,38 +13165,15 @@
             <a:pPr algn="l"/>
             <a:r>
               <a:rPr lang="en-US" sz="1100" b="0" dirty="0"/>
-              <a:t>[3] Alvarez, Lizette. “In Florida, Searching for Gas and Water, and Watching Irma." The New York Times, https://www.nytimes.com/2017/09/07/us/florida-irma-hurricane-supplies.html, 2017, accessed on 07/07/2023</a:t>
+              <a:t>[7] Alvarez, Lizette. “In Florida, Searching for Gas and Water, and Watching Irma." The New York Times, https://www.nytimes.com/2017/09/07/us/florida-irma-hurricane-supplies.html, 2017, accessed on 07/07/2023</a:t>
             </a:r>
           </a:p>
           <a:p>
             <a:pPr algn="l"/>
-            <a:r>
-              <a:rPr lang="en-US" sz="1100" b="0" dirty="0"/>
-              <a:t>[4] Alan </a:t>
-            </a:r>
-            <a:r>
-              <a:rPr lang="en-US" sz="1100" b="0" dirty="0" err="1"/>
-              <a:t>Mislove</a:t>
-            </a:r>
-            <a:r>
-              <a:rPr lang="en-US" sz="1100" b="0" dirty="0"/>
-              <a:t> et al. “Measurement and analysis of online social networks”. In: Proceedings of the 7thACM SIGCOMM conference on Internet measurement. 2007, pp. 29–42.</a:t>
-            </a:r>
+            <a:endParaRPr lang="en-US" sz="1100" b="0" dirty="0"/>
           </a:p>
           <a:p>
             <a:pPr algn="l"/>
-            <a:r>
-              <a:rPr lang="en-US" sz="1100" b="0" dirty="0"/>
-              <a:t>[5] Marcella </a:t>
-            </a:r>
-            <a:r>
-              <a:rPr lang="en-US" sz="1100" b="0" dirty="0" err="1"/>
-              <a:t>Tambuscio</a:t>
-            </a:r>
-            <a:r>
-              <a:rPr lang="en-US" sz="1100" b="0" dirty="0"/>
-              <a:t> et al. “Fact-checking effect on viral hoaxes: A model of misinformation spreading social networks”. In: Proceedings of the 24th international conference on World Wide Web. 2015,pp. 977–982.</a:t>
-            </a:r>
             <a:endParaRPr lang="de-DE" sz="1100" b="0" dirty="0"/>
           </a:p>
         </p:txBody>
@@ -12655,7 +13238,7 @@
           <a:p>
             <a:r>
               <a:rPr lang="en-US" dirty="0"/>
-              <a:t>Information can be a powerful tool to change human behavior</a:t>
+              <a:t>Panic Buying and Overconsumption became a very prominent topic during the COIVD-19 Pandemic</a:t>
             </a:r>
           </a:p>
         </p:txBody>
@@ -12796,15 +13379,7 @@
             </a:r>
             <a:r>
               <a:rPr lang="en-US" sz="1800" b="0" dirty="0"/>
-              <a:t>: People bought much greater number of Disinfectants and Soap in fear of the infectious disease. At the start of the lockdowns, the sales of Toilet </a:t>
-            </a:r>
-            <a:r>
-              <a:rPr lang="en-US" dirty="0"/>
-              <a:t>P</a:t>
-            </a:r>
-            <a:r>
-              <a:rPr lang="en-US" sz="1800" b="0" dirty="0"/>
-              <a:t>aper and Yeast increased greatly</a:t>
+              <a:t>: People bought much greater number of disinfectants and soap in fear of the infectious disease. At the start of the lockdowns, the sales of toilet paper and yeast increased greatly</a:t>
             </a:r>
             <a:endParaRPr lang="de-DE" sz="1800" b="0" dirty="0"/>
           </a:p>
@@ -12814,6 +13389,55 @@
               <a:buChar char="è"/>
             </a:pPr>
             <a:endParaRPr lang="de-DE" sz="1800" b="0" dirty="0"/>
+          </a:p>
+        </p:txBody>
+      </p:sp>
+      <p:sp>
+        <p:nvSpPr>
+          <p:cNvPr id="3" name="Rechteck 2">
+            <a:extLst>
+              <a:ext uri="{FF2B5EF4-FFF2-40B4-BE49-F238E27FC236}">
+                <a16:creationId xmlns:a16="http://schemas.microsoft.com/office/drawing/2014/main" id="{8B35637B-BF00-FF5A-55D9-1D8C33789625}"/>
+              </a:ext>
+            </a:extLst>
+          </p:cNvPr>
+          <p:cNvSpPr/>
+          <p:nvPr/>
+        </p:nvSpPr>
+        <p:spPr>
+          <a:xfrm>
+            <a:off x="191344" y="5373216"/>
+            <a:ext cx="3456384" cy="216024"/>
+          </a:xfrm>
+          <a:prstGeom prst="rect">
+            <a:avLst/>
+          </a:prstGeom>
+        </p:spPr>
+        <p:style>
+          <a:lnRef idx="2">
+            <a:schemeClr val="accent3"/>
+          </a:lnRef>
+          <a:fillRef idx="1">
+            <a:schemeClr val="lt1"/>
+          </a:fillRef>
+          <a:effectRef idx="0">
+            <a:schemeClr val="accent3"/>
+          </a:effectRef>
+          <a:fontRef idx="minor">
+            <a:schemeClr val="dk1"/>
+          </a:fontRef>
+        </p:style>
+        <p:txBody>
+          <a:bodyPr rot="0" spcFirstLastPara="0" vertOverflow="overflow" horzOverflow="overflow" vert="horz" wrap="square" lIns="91440" tIns="45720" rIns="91440" bIns="45720" numCol="1" spcCol="0" rtlCol="0" fromWordArt="0" anchor="ctr" anchorCtr="0" forceAA="0" compatLnSpc="1">
+            <a:prstTxWarp prst="textNoShape">
+              <a:avLst/>
+            </a:prstTxWarp>
+            <a:noAutofit/>
+          </a:bodyPr>
+          <a:lstStyle/>
+          <a:p>
+            <a:pPr algn="ctr"/>
+            <a:endParaRPr lang="de-DE"/>
           </a:p>
         </p:txBody>
       </p:sp>
@@ -12831,7 +13455,7 @@
 </file>
 
 <file path=ppt/slides/slide3.xml><?xml version="1.0" encoding="utf-8"?>
-<p:sld xmlns:a="http://schemas.openxmlformats.org/drawingml/2006/main" xmlns:r="http://schemas.openxmlformats.org/officeDocument/2006/relationships" xmlns:p="http://schemas.openxmlformats.org/presentationml/2006/main">
+<p:sld xmlns:a="http://schemas.openxmlformats.org/drawingml/2006/main" xmlns:r="http://schemas.openxmlformats.org/officeDocument/2006/relationships" xmlns:p="http://schemas.openxmlformats.org/presentationml/2006/main" show="0">
   <p:cSld>
     <p:spTree>
       <p:nvGrpSpPr>
@@ -12977,8 +13601,12 @@
               <a:t>Other </a:t>
             </a:r>
             <a:r>
+              <a:rPr lang="de-DE" dirty="0" err="1"/>
+              <a:t>i</a:t>
+            </a:r>
+            <a:r>
               <a:rPr lang="de-DE" sz="1800" b="0" dirty="0" err="1"/>
-              <a:t>Instances</a:t>
+              <a:t>nstances</a:t>
             </a:r>
             <a:r>
               <a:rPr lang="de-DE" sz="1800" b="0" dirty="0"/>
@@ -12990,19 +13618,35 @@
             </a:r>
             <a:r>
               <a:rPr lang="de-DE" sz="1800" b="0" dirty="0"/>
-              <a:t> Panic </a:t>
+              <a:t> </a:t>
             </a:r>
             <a:r>
               <a:rPr lang="de-DE" sz="1800" b="0" dirty="0" err="1"/>
-              <a:t>Buying</a:t>
+              <a:t>panic</a:t>
             </a:r>
             <a:r>
               <a:rPr lang="de-DE" sz="1800" b="0" dirty="0"/>
               <a:t> </a:t>
             </a:r>
             <a:r>
+              <a:rPr lang="de-DE" dirty="0" err="1"/>
+              <a:t>b</a:t>
+            </a:r>
+            <a:r>
               <a:rPr lang="de-DE" sz="1800" b="0" dirty="0" err="1"/>
-              <a:t>Behavior</a:t>
+              <a:t>uying</a:t>
+            </a:r>
+            <a:r>
+              <a:rPr lang="de-DE" sz="1800" b="0" dirty="0"/>
+              <a:t> </a:t>
+            </a:r>
+            <a:r>
+              <a:rPr lang="de-DE" dirty="0" err="1"/>
+              <a:t>b</a:t>
+            </a:r>
+            <a:r>
+              <a:rPr lang="de-DE" sz="1800" b="0" dirty="0" err="1"/>
+              <a:t>ehavior</a:t>
             </a:r>
             <a:r>
               <a:rPr lang="de-DE" sz="1800" b="0" dirty="0"/>
@@ -13034,7 +13678,7 @@
             </a:r>
             <a:r>
               <a:rPr lang="en-US" sz="1800" b="0" dirty="0"/>
-              <a:t>rush to buy quinine and other medications [1]</a:t>
+              <a:t>rush to buy quinine and other medications [5]</a:t>
             </a:r>
           </a:p>
           <a:p>
@@ -13050,7 +13694,7 @@
             </a:pPr>
             <a:r>
               <a:rPr lang="en-US" sz="1800" b="0" dirty="0"/>
-              <a:t>Cuban Missile Crisis, 1962: increased demand for canned foods [2]</a:t>
+              <a:t>Cuban Missile Crisis, 1962: increased demand for canned foods [6]</a:t>
             </a:r>
           </a:p>
           <a:p>
@@ -13066,7 +13710,7 @@
             </a:pPr>
             <a:r>
               <a:rPr lang="en-US" sz="1800" b="0" dirty="0"/>
-              <a:t>Hurricane Irma, 2017: panic buying of fuel, bottled water and other essential goods [3]</a:t>
+              <a:t>Hurricane Irma, 2017: panic buying of fuel, bottled water and other essential goods [7]</a:t>
             </a:r>
           </a:p>
           <a:p>
@@ -13084,7 +13728,7 @@
               <a:rPr lang="en-US" sz="1800" b="0" dirty="0">
                 <a:sym typeface="Wingdings" panose="05000000000000000000" pitchFamily="2" charset="2"/>
               </a:rPr>
-              <a:t>Panic Buying is an issue that already exists for a long time !</a:t>
+              <a:t>Panic buying is an issue that already exists for a long time!</a:t>
             </a:r>
             <a:endParaRPr lang="de-DE" sz="1800" b="0" dirty="0"/>
           </a:p>
@@ -13282,6 +13926,308 @@
           <p:cNvPr id="2" name="Titel 1">
             <a:extLst>
               <a:ext uri="{FF2B5EF4-FFF2-40B4-BE49-F238E27FC236}">
+                <a16:creationId xmlns:a16="http://schemas.microsoft.com/office/drawing/2014/main" id="{743C51BF-52B8-F94F-6759-7D81487AA530}"/>
+              </a:ext>
+            </a:extLst>
+          </p:cNvPr>
+          <p:cNvSpPr>
+            <a:spLocks noGrp="1"/>
+          </p:cNvSpPr>
+          <p:nvPr>
+            <p:ph type="title"/>
+          </p:nvPr>
+        </p:nvSpPr>
+        <p:spPr>
+          <a:xfrm>
+            <a:off x="478366" y="488950"/>
+            <a:ext cx="9722089" cy="838200"/>
+          </a:xfrm>
+        </p:spPr>
+        <p:txBody>
+          <a:bodyPr/>
+          <a:lstStyle/>
+          <a:p>
+            <a:r>
+              <a:rPr lang="de-DE" dirty="0" err="1"/>
+              <a:t>Consumption</a:t>
+            </a:r>
+            <a:r>
+              <a:rPr lang="de-DE" dirty="0"/>
+              <a:t> </a:t>
+            </a:r>
+            <a:r>
+              <a:rPr lang="de-DE" dirty="0" err="1"/>
+              <a:t>can</a:t>
+            </a:r>
+            <a:r>
+              <a:rPr lang="de-DE" dirty="0"/>
+              <a:t> </a:t>
+            </a:r>
+            <a:r>
+              <a:rPr lang="de-DE" dirty="0" err="1"/>
+              <a:t>be</a:t>
+            </a:r>
+            <a:r>
+              <a:rPr lang="de-DE" dirty="0"/>
+              <a:t> </a:t>
+            </a:r>
+            <a:r>
+              <a:rPr lang="de-DE" dirty="0" err="1"/>
+              <a:t>affected</a:t>
+            </a:r>
+            <a:r>
+              <a:rPr lang="de-DE" dirty="0"/>
+              <a:t> </a:t>
+            </a:r>
+            <a:r>
+              <a:rPr lang="de-DE" dirty="0" err="1"/>
+              <a:t>by</a:t>
+            </a:r>
+            <a:r>
+              <a:rPr lang="de-DE" dirty="0"/>
+              <a:t> </a:t>
+            </a:r>
+            <a:r>
+              <a:rPr lang="de-DE" dirty="0" err="1"/>
+              <a:t>Social</a:t>
+            </a:r>
+            <a:r>
+              <a:rPr lang="de-DE" dirty="0"/>
+              <a:t> Media </a:t>
+            </a:r>
+          </a:p>
+        </p:txBody>
+      </p:sp>
+      <p:pic>
+        <p:nvPicPr>
+          <p:cNvPr id="5" name="Grafik 4">
+            <a:extLst>
+              <a:ext uri="{FF2B5EF4-FFF2-40B4-BE49-F238E27FC236}">
+                <a16:creationId xmlns:a16="http://schemas.microsoft.com/office/drawing/2014/main" id="{C3364D0F-4EEA-BB65-3353-E1AFE0F1C3D5}"/>
+              </a:ext>
+            </a:extLst>
+          </p:cNvPr>
+          <p:cNvPicPr>
+            <a:picLocks noChangeAspect="1"/>
+          </p:cNvPicPr>
+          <p:nvPr/>
+        </p:nvPicPr>
+        <p:blipFill>
+          <a:blip r:embed="rId2"/>
+          <a:stretch>
+            <a:fillRect/>
+          </a:stretch>
+        </p:blipFill>
+        <p:spPr>
+          <a:xfrm>
+            <a:off x="5071651" y="1641029"/>
+            <a:ext cx="6495983" cy="2316116"/>
+          </a:xfrm>
+          <a:prstGeom prst="rect">
+            <a:avLst/>
+          </a:prstGeom>
+        </p:spPr>
+      </p:pic>
+      <p:pic>
+        <p:nvPicPr>
+          <p:cNvPr id="9" name="Grafik 8">
+            <a:extLst>
+              <a:ext uri="{FF2B5EF4-FFF2-40B4-BE49-F238E27FC236}">
+                <a16:creationId xmlns:a16="http://schemas.microsoft.com/office/drawing/2014/main" id="{0B93825C-7CA2-5D79-F7AE-38720D88F443}"/>
+              </a:ext>
+            </a:extLst>
+          </p:cNvPr>
+          <p:cNvPicPr>
+            <a:picLocks noChangeAspect="1"/>
+          </p:cNvPicPr>
+          <p:nvPr/>
+        </p:nvPicPr>
+        <p:blipFill>
+          <a:blip r:embed="rId3"/>
+          <a:stretch>
+            <a:fillRect/>
+          </a:stretch>
+        </p:blipFill>
+        <p:spPr>
+          <a:xfrm>
+            <a:off x="335360" y="1854187"/>
+            <a:ext cx="3451610" cy="4063220"/>
+          </a:xfrm>
+          <a:prstGeom prst="rect">
+            <a:avLst/>
+          </a:prstGeom>
+        </p:spPr>
+      </p:pic>
+      <p:sp>
+        <p:nvSpPr>
+          <p:cNvPr id="10" name="Textfeld 9">
+            <a:extLst>
+              <a:ext uri="{FF2B5EF4-FFF2-40B4-BE49-F238E27FC236}">
+                <a16:creationId xmlns:a16="http://schemas.microsoft.com/office/drawing/2014/main" id="{4815A3AA-F7D9-2140-8D93-C24B81B58A53}"/>
+              </a:ext>
+            </a:extLst>
+          </p:cNvPr>
+          <p:cNvSpPr txBox="1"/>
+          <p:nvPr/>
+        </p:nvSpPr>
+        <p:spPr>
+          <a:xfrm>
+            <a:off x="11055533" y="2099641"/>
+            <a:ext cx="648072" cy="246221"/>
+          </a:xfrm>
+          <a:prstGeom prst="rect">
+            <a:avLst/>
+          </a:prstGeom>
+          <a:noFill/>
+        </p:spPr>
+        <p:txBody>
+          <a:bodyPr wrap="square" rtlCol="0">
+            <a:spAutoFit/>
+          </a:bodyPr>
+          <a:lstStyle/>
+          <a:p>
+            <a:r>
+              <a:rPr lang="de-DE" sz="1000" dirty="0"/>
+              <a:t>[1]</a:t>
+            </a:r>
+          </a:p>
+        </p:txBody>
+      </p:sp>
+      <p:pic>
+        <p:nvPicPr>
+          <p:cNvPr id="12" name="Grafik 11">
+            <a:extLst>
+              <a:ext uri="{FF2B5EF4-FFF2-40B4-BE49-F238E27FC236}">
+                <a16:creationId xmlns:a16="http://schemas.microsoft.com/office/drawing/2014/main" id="{084AA0F4-4A20-63CB-9402-AADC4D7B1F27}"/>
+              </a:ext>
+            </a:extLst>
+          </p:cNvPr>
+          <p:cNvPicPr>
+            <a:picLocks noChangeAspect="1"/>
+          </p:cNvPicPr>
+          <p:nvPr/>
+        </p:nvPicPr>
+        <p:blipFill>
+          <a:blip r:embed="rId4"/>
+          <a:stretch>
+            <a:fillRect/>
+          </a:stretch>
+        </p:blipFill>
+        <p:spPr>
+          <a:xfrm>
+            <a:off x="3935759" y="3957145"/>
+            <a:ext cx="4353037" cy="2411905"/>
+          </a:xfrm>
+          <a:prstGeom prst="rect">
+            <a:avLst/>
+          </a:prstGeom>
+        </p:spPr>
+      </p:pic>
+      <p:sp>
+        <p:nvSpPr>
+          <p:cNvPr id="13" name="Textfeld 12">
+            <a:extLst>
+              <a:ext uri="{FF2B5EF4-FFF2-40B4-BE49-F238E27FC236}">
+                <a16:creationId xmlns:a16="http://schemas.microsoft.com/office/drawing/2014/main" id="{96122549-0C35-88A5-FDEF-40616399C8B2}"/>
+              </a:ext>
+            </a:extLst>
+          </p:cNvPr>
+          <p:cNvSpPr txBox="1"/>
+          <p:nvPr/>
+        </p:nvSpPr>
+        <p:spPr>
+          <a:xfrm>
+            <a:off x="3786970" y="1927621"/>
+            <a:ext cx="648072" cy="246221"/>
+          </a:xfrm>
+          <a:prstGeom prst="rect">
+            <a:avLst/>
+          </a:prstGeom>
+          <a:noFill/>
+        </p:spPr>
+        <p:txBody>
+          <a:bodyPr wrap="square" rtlCol="0">
+            <a:spAutoFit/>
+          </a:bodyPr>
+          <a:lstStyle/>
+          <a:p>
+            <a:r>
+              <a:rPr lang="de-DE" sz="1000" dirty="0"/>
+              <a:t>[2]</a:t>
+            </a:r>
+          </a:p>
+        </p:txBody>
+      </p:sp>
+      <p:sp>
+        <p:nvSpPr>
+          <p:cNvPr id="14" name="Textfeld 13">
+            <a:extLst>
+              <a:ext uri="{FF2B5EF4-FFF2-40B4-BE49-F238E27FC236}">
+                <a16:creationId xmlns:a16="http://schemas.microsoft.com/office/drawing/2014/main" id="{FA2BB971-9290-F6E5-2737-0041A1BC428C}"/>
+              </a:ext>
+            </a:extLst>
+          </p:cNvPr>
+          <p:cNvSpPr txBox="1"/>
+          <p:nvPr/>
+        </p:nvSpPr>
+        <p:spPr>
+          <a:xfrm>
+            <a:off x="8113549" y="4016438"/>
+            <a:ext cx="648072" cy="246221"/>
+          </a:xfrm>
+          <a:prstGeom prst="rect">
+            <a:avLst/>
+          </a:prstGeom>
+          <a:noFill/>
+        </p:spPr>
+        <p:txBody>
+          <a:bodyPr wrap="square" rtlCol="0">
+            <a:spAutoFit/>
+          </a:bodyPr>
+          <a:lstStyle/>
+          <a:p>
+            <a:r>
+              <a:rPr lang="de-DE" sz="1000" dirty="0"/>
+              <a:t>[2]</a:t>
+            </a:r>
+          </a:p>
+        </p:txBody>
+      </p:sp>
+    </p:spTree>
+    <p:extLst>
+      <p:ext uri="{BB962C8B-B14F-4D97-AF65-F5344CB8AC3E}">
+        <p14:creationId xmlns:p14="http://schemas.microsoft.com/office/powerpoint/2010/main" val="2530693109"/>
+      </p:ext>
+    </p:extLst>
+  </p:cSld>
+  <p:clrMapOvr>
+    <a:masterClrMapping/>
+  </p:clrMapOvr>
+</p:sld>
+</file>
+
+<file path=ppt/slides/slide5.xml><?xml version="1.0" encoding="utf-8"?>
+<p:sld xmlns:a="http://schemas.openxmlformats.org/drawingml/2006/main" xmlns:r="http://schemas.openxmlformats.org/officeDocument/2006/relationships" xmlns:p="http://schemas.openxmlformats.org/presentationml/2006/main">
+  <p:cSld>
+    <p:spTree>
+      <p:nvGrpSpPr>
+        <p:cNvPr id="1" name=""/>
+        <p:cNvGrpSpPr/>
+        <p:nvPr/>
+      </p:nvGrpSpPr>
+      <p:grpSpPr>
+        <a:xfrm>
+          <a:off x="0" y="0"/>
+          <a:ext cx="0" cy="0"/>
+          <a:chOff x="0" y="0"/>
+          <a:chExt cx="0" cy="0"/>
+        </a:xfrm>
+      </p:grpSpPr>
+      <p:sp>
+        <p:nvSpPr>
+          <p:cNvPr id="2" name="Titel 1">
+            <a:extLst>
+              <a:ext uri="{FF2B5EF4-FFF2-40B4-BE49-F238E27FC236}">
                 <a16:creationId xmlns:a16="http://schemas.microsoft.com/office/drawing/2014/main" id="{6AF09439-EB36-1305-C4E3-DE20F45DDED3}"/>
               </a:ext>
             </a:extLst>
@@ -13324,11 +14270,19 @@
             </a:r>
             <a:r>
               <a:rPr lang="de-DE" dirty="0"/>
-              <a:t> Panic </a:t>
+              <a:t> </a:t>
             </a:r>
             <a:r>
               <a:rPr lang="de-DE" dirty="0" err="1"/>
-              <a:t>Buying</a:t>
+              <a:t>changes</a:t>
+            </a:r>
+            <a:r>
+              <a:rPr lang="de-DE" dirty="0"/>
+              <a:t> in </a:t>
+            </a:r>
+            <a:r>
+              <a:rPr lang="de-DE" dirty="0" err="1"/>
+              <a:t>Consumption</a:t>
             </a:r>
             <a:r>
               <a:rPr lang="de-DE" dirty="0"/>
@@ -13336,11 +14290,27 @@
             </a:r>
             <a:r>
               <a:rPr lang="de-DE" dirty="0" err="1"/>
-              <a:t>Behavior</a:t>
+              <a:t>lead</a:t>
             </a:r>
             <a:r>
               <a:rPr lang="de-DE" dirty="0"/>
               <a:t> </a:t>
+            </a:r>
+            <a:r>
+              <a:rPr lang="de-DE" dirty="0" err="1"/>
+              <a:t>by</a:t>
+            </a:r>
+            <a:r>
+              <a:rPr lang="de-DE" dirty="0"/>
+              <a:t> </a:t>
+            </a:r>
+            <a:r>
+              <a:rPr lang="de-DE" dirty="0" err="1"/>
+              <a:t>Social</a:t>
+            </a:r>
+            <a:r>
+              <a:rPr lang="de-DE" dirty="0"/>
+              <a:t> Media </a:t>
             </a:r>
             <a:r>
               <a:rPr lang="de-DE" dirty="0" err="1"/>
@@ -13684,7 +14654,7 @@
 </p:sld>
 </file>
 
-<file path=ppt/slides/slide5.xml><?xml version="1.0" encoding="utf-8"?>
+<file path=ppt/slides/slide6.xml><?xml version="1.0" encoding="utf-8"?>
 <p:sld xmlns:a="http://schemas.openxmlformats.org/drawingml/2006/main" xmlns:r="http://schemas.openxmlformats.org/officeDocument/2006/relationships" xmlns:p="http://schemas.openxmlformats.org/presentationml/2006/main">
   <p:cSld>
     <p:spTree>
@@ -13724,15 +14694,7 @@
           <a:p>
             <a:r>
               <a:rPr lang="en-US" dirty="0"/>
-              <a:t>Idea: </a:t>
-            </a:r>
-            <a:r>
-              <a:rPr lang="en-US" dirty="0" err="1"/>
-              <a:t>Analyse</a:t>
-            </a:r>
-            <a:r>
-              <a:rPr lang="en-US" dirty="0"/>
-              <a:t> the Information Flow in Social Networks and check if it could affect the Power Grid</a:t>
+              <a:t>Idea: Analyze the Information Flow in Social Networks and check if it could affect the Power Grid</a:t>
             </a:r>
           </a:p>
         </p:txBody>
@@ -14310,7 +15272,7 @@
 </p:sld>
 </file>
 
-<file path=ppt/slides/slide6.xml><?xml version="1.0" encoding="utf-8"?>
+<file path=ppt/slides/slide7.xml><?xml version="1.0" encoding="utf-8"?>
 <p:sld xmlns:a="http://schemas.openxmlformats.org/drawingml/2006/main" xmlns:r="http://schemas.openxmlformats.org/officeDocument/2006/relationships" xmlns:p="http://schemas.openxmlformats.org/presentationml/2006/main">
   <p:cSld>
     <p:spTree>
@@ -14472,7 +15434,7 @@
           <a:p>
             <a:r>
               <a:rPr lang="en-US" dirty="0"/>
-              <a:t>The Social Media Graph is created via Random Graph Algorithms</a:t>
+              <a:t>The Social Media Network Graph is modelled via Random Graph Algorithms</a:t>
             </a:r>
           </a:p>
         </p:txBody>
@@ -14730,8 +15692,8 @@
         </p:nvSpPr>
         <p:spPr>
           <a:xfrm>
-            <a:off x="478368" y="1700808"/>
-            <a:ext cx="8856156" cy="4608512"/>
+            <a:off x="478368" y="1546538"/>
+            <a:ext cx="8856156" cy="4681490"/>
           </a:xfrm>
           <a:prstGeom prst="roundRect">
             <a:avLst/>
@@ -14778,7 +15740,23 @@
             </a:r>
             <a:r>
               <a:rPr lang="de-DE" sz="1800" b="0" dirty="0"/>
-              <a:t> Media Networks </a:t>
+              <a:t> </a:t>
+            </a:r>
+            <a:r>
+              <a:rPr lang="de-DE" sz="1800" b="0" dirty="0" err="1"/>
+              <a:t>media</a:t>
+            </a:r>
+            <a:r>
+              <a:rPr lang="de-DE" sz="1800" b="0" dirty="0"/>
+              <a:t> </a:t>
+            </a:r>
+            <a:r>
+              <a:rPr lang="de-DE" sz="1800" b="0" dirty="0" err="1"/>
+              <a:t>networks</a:t>
+            </a:r>
+            <a:r>
+              <a:rPr lang="de-DE" sz="1800" b="0" dirty="0"/>
+              <a:t> </a:t>
             </a:r>
             <a:r>
               <a:rPr lang="de-DE" sz="1800" b="0" dirty="0" err="1"/>
@@ -14810,11 +15788,23 @@
             </a:pPr>
             <a:r>
               <a:rPr lang="de-DE" sz="1800" b="0" dirty="0"/>
-              <a:t>Small World </a:t>
+              <a:t>Small </a:t>
             </a:r>
             <a:r>
               <a:rPr lang="de-DE" sz="1800" b="0" dirty="0" err="1"/>
-              <a:t>Characteristic</a:t>
+              <a:t>world</a:t>
+            </a:r>
+            <a:r>
+              <a:rPr lang="de-DE" sz="1800" b="0" dirty="0"/>
+              <a:t> </a:t>
+            </a:r>
+            <a:r>
+              <a:rPr lang="de-DE" dirty="0" err="1"/>
+              <a:t>c</a:t>
+            </a:r>
+            <a:r>
+              <a:rPr lang="de-DE" sz="1800" b="0" dirty="0" err="1"/>
+              <a:t>haracteristic</a:t>
             </a:r>
             <a:endParaRPr lang="de-DE" sz="1800" b="0" dirty="0"/>
           </a:p>
@@ -14831,12 +15821,17 @@
             </a:pPr>
             <a:r>
               <a:rPr lang="de-DE" dirty="0" err="1"/>
-              <a:t>Scale</a:t>
+              <a:t>Scale-free</a:t>
             </a:r>
             <a:r>
               <a:rPr lang="de-DE" dirty="0"/>
-              <a:t>-Free Networks</a:t>
-            </a:r>
+              <a:t> </a:t>
+            </a:r>
+            <a:r>
+              <a:rPr lang="de-DE" dirty="0" err="1"/>
+              <a:t>networks</a:t>
+            </a:r>
+            <a:endParaRPr lang="de-DE" dirty="0"/>
           </a:p>
           <a:p>
             <a:pPr marL="522900" indent="-342900">
@@ -14859,7 +15854,7 @@
             </a:r>
             <a:r>
               <a:rPr lang="de-DE" sz="1800" b="0" dirty="0" err="1"/>
-              <a:t>Clustered</a:t>
+              <a:t>clustered</a:t>
             </a:r>
             <a:endParaRPr lang="de-DE" dirty="0"/>
           </a:p>
@@ -14944,15 +15939,23 @@
             </a:r>
             <a:r>
               <a:rPr lang="de-DE" dirty="0"/>
+              <a:t> social </a:t>
+            </a:r>
+            <a:r>
+              <a:rPr lang="de-DE" dirty="0" err="1"/>
+              <a:t>media</a:t>
+            </a:r>
+            <a:r>
+              <a:rPr lang="de-DE" dirty="0"/>
               <a:t> </a:t>
             </a:r>
             <a:r>
               <a:rPr lang="de-DE" dirty="0" err="1"/>
-              <a:t>Social</a:t>
+              <a:t>networks</a:t>
             </a:r>
             <a:r>
               <a:rPr lang="de-DE" dirty="0"/>
-              <a:t> Media Networks:</a:t>
+              <a:t>:</a:t>
             </a:r>
           </a:p>
           <a:p>
@@ -14972,8 +15975,13 @@
             </a:r>
             <a:r>
               <a:rPr lang="de-DE" dirty="0"/>
-              <a:t>–Albert Model</a:t>
-            </a:r>
+              <a:t>–Albert </a:t>
+            </a:r>
+            <a:r>
+              <a:rPr lang="de-DE" dirty="0" err="1"/>
+              <a:t>model</a:t>
+            </a:r>
+            <a:endParaRPr lang="de-DE" dirty="0"/>
           </a:p>
           <a:p>
             <a:pPr marL="465750" indent="-285750">
@@ -14996,7 +16004,11 @@
             </a:r>
             <a:r>
               <a:rPr lang="de-DE" dirty="0"/>
-              <a:t> Model</a:t>
+              <a:t> </a:t>
+            </a:r>
+            <a:r>
+              <a:rPr lang="de-DE" dirty="0" err="1"/>
+              <a:t>model</a:t>
             </a:r>
             <a:endParaRPr lang="de-DE" sz="1800" b="0" dirty="0"/>
           </a:p>
@@ -15063,7 +16075,7 @@
 </p:sld>
 </file>
 
-<file path=ppt/slides/slide7.xml><?xml version="1.0" encoding="utf-8"?>
+<file path=ppt/slides/slide8.xml><?xml version="1.0" encoding="utf-8"?>
 <p:sld xmlns:a="http://schemas.openxmlformats.org/drawingml/2006/main" xmlns:r="http://schemas.openxmlformats.org/officeDocument/2006/relationships" xmlns:p="http://schemas.openxmlformats.org/presentationml/2006/main">
   <p:cSld>
     <p:spTree>
@@ -15491,8 +16503,8 @@
         </p:nvSpPr>
         <p:spPr>
           <a:xfrm>
-            <a:off x="478368" y="1700808"/>
-            <a:ext cx="8856156" cy="4608512"/>
+            <a:off x="478368" y="1546538"/>
+            <a:ext cx="8856156" cy="4681490"/>
           </a:xfrm>
           <a:prstGeom prst="roundRect">
             <a:avLst/>
@@ -15531,7 +16543,15 @@
             </a:pPr>
             <a:r>
               <a:rPr lang="de-DE" dirty="0"/>
-              <a:t>The SIR Model </a:t>
+              <a:t>The SIR </a:t>
+            </a:r>
+            <a:r>
+              <a:rPr lang="de-DE" dirty="0" err="1"/>
+              <a:t>model</a:t>
+            </a:r>
+            <a:r>
+              <a:rPr lang="de-DE" dirty="0"/>
+              <a:t> </a:t>
             </a:r>
             <a:r>
               <a:rPr lang="de-DE" dirty="0" err="1"/>
@@ -15571,11 +16591,27 @@
             </a:r>
             <a:r>
               <a:rPr lang="de-DE" dirty="0"/>
-              <a:t> Information Propagation </a:t>
+              <a:t> </a:t>
             </a:r>
             <a:r>
               <a:rPr lang="de-DE" dirty="0" err="1"/>
-              <a:t>Process</a:t>
+              <a:t>information</a:t>
+            </a:r>
+            <a:r>
+              <a:rPr lang="de-DE" dirty="0"/>
+              <a:t> </a:t>
+            </a:r>
+            <a:r>
+              <a:rPr lang="de-DE" dirty="0" err="1"/>
+              <a:t>propagation</a:t>
+            </a:r>
+            <a:r>
+              <a:rPr lang="de-DE" dirty="0"/>
+              <a:t> </a:t>
+            </a:r>
+            <a:r>
+              <a:rPr lang="de-DE" dirty="0" err="1"/>
+              <a:t>process</a:t>
             </a:r>
             <a:r>
               <a:rPr lang="de-DE" dirty="0"/>
@@ -15603,7 +16639,15 @@
             </a:r>
             <a:r>
               <a:rPr lang="de-DE" sz="1800" b="0" dirty="0"/>
-              <a:t> States:</a:t>
+              <a:t> </a:t>
+            </a:r>
+            <a:r>
+              <a:rPr lang="de-DE" sz="1800" b="0" dirty="0" err="1"/>
+              <a:t>states</a:t>
+            </a:r>
+            <a:r>
+              <a:rPr lang="de-DE" sz="1800" b="0" dirty="0"/>
+              <a:t>:</a:t>
             </a:r>
           </a:p>
           <a:p>
@@ -15679,8 +16723,12 @@
               <a:buChar char="•"/>
             </a:pPr>
             <a:r>
+              <a:rPr lang="en-US" dirty="0"/>
+              <a:t>N</a:t>
+            </a:r>
+            <a:r>
               <a:rPr lang="en-US" sz="1800" b="0" dirty="0"/>
-              <a:t>If the neighbors are predominantly infected </a:t>
+              <a:t>eighbors are predominantly infected </a:t>
             </a:r>
             <a:r>
               <a:rPr lang="en-US" sz="1800" b="0" dirty="0">
@@ -15701,8 +16749,12 @@
               <a:buChar char="•"/>
             </a:pPr>
             <a:r>
+              <a:rPr lang="en-US" dirty="0"/>
+              <a:t>N</a:t>
+            </a:r>
+            <a:r>
               <a:rPr lang="en-US" sz="1800" b="0" dirty="0"/>
-              <a:t>If the neighbors are predominantly recovered </a:t>
+              <a:t>eighbors are predominantly recovered </a:t>
             </a:r>
             <a:r>
               <a:rPr lang="en-US" sz="1800" b="0" dirty="0">
@@ -15795,7 +16847,7 @@
 </p:sld>
 </file>
 
-<file path=ppt/slides/slide8.xml><?xml version="1.0" encoding="utf-8"?>
+<file path=ppt/slides/slide9.xml><?xml version="1.0" encoding="utf-8"?>
 <p:sld xmlns:a="http://schemas.openxmlformats.org/drawingml/2006/main" xmlns:r="http://schemas.openxmlformats.org/officeDocument/2006/relationships" xmlns:p="http://schemas.openxmlformats.org/presentationml/2006/main">
   <p:cSld>
     <p:spTree>
@@ -15957,15 +17009,7 @@
           <a:p>
             <a:r>
               <a:rPr lang="en-US" dirty="0"/>
-              <a:t>Implementation of a Simulator to </a:t>
-            </a:r>
-            <a:r>
-              <a:rPr lang="en-US" dirty="0" err="1"/>
-              <a:t>analyse</a:t>
-            </a:r>
-            <a:r>
-              <a:rPr lang="en-US" dirty="0"/>
-              <a:t> the Effects on the Power Grid</a:t>
+              <a:t>Implementation of a Simulator to analyze the Effects on the Power Grid</a:t>
             </a:r>
           </a:p>
         </p:txBody>
@@ -16261,7 +17305,7 @@
         </p:nvSpPr>
         <p:spPr>
           <a:xfrm>
-            <a:off x="499161" y="3284984"/>
+            <a:off x="499161" y="3050404"/>
             <a:ext cx="8856156" cy="1750717"/>
           </a:xfrm>
           <a:prstGeom prst="roundRect">
@@ -16329,15 +17373,7 @@
             </a:pPr>
             <a:r>
               <a:rPr lang="en-US" sz="1800" b="0" dirty="0"/>
-              <a:t>Start with one source of </a:t>
-            </a:r>
-            <a:r>
-              <a:rPr lang="en-US" dirty="0"/>
-              <a:t>I</a:t>
-            </a:r>
-            <a:r>
-              <a:rPr lang="en-US" sz="1800" b="0" dirty="0"/>
-              <a:t>nformation</a:t>
+              <a:t>Start with one source of information</a:t>
             </a:r>
           </a:p>
           <a:p>
@@ -16357,6 +17393,22 @@
             </a:r>
           </a:p>
           <a:p>
+            <a:pPr marL="1037250" lvl="1" indent="-400050">
+              <a:spcBef>
+                <a:spcPts val="200"/>
+              </a:spcBef>
+              <a:spcAft>
+                <a:spcPts val="230"/>
+              </a:spcAft>
+              <a:buFont typeface="+mj-lt"/>
+              <a:buAutoNum type="romanLcPeriod"/>
+            </a:pPr>
+            <a:r>
+              <a:rPr lang="en-US" b="0" dirty="0"/>
+              <a:t>Calculate the power used in the network</a:t>
+            </a:r>
+          </a:p>
+          <a:p>
             <a:pPr marL="980100" lvl="1" indent="-342900">
               <a:spcBef>
                 <a:spcPts val="200"/>
@@ -16365,23 +17417,7 @@
                 <a:spcPts val="230"/>
               </a:spcAft>
               <a:buFont typeface="+mj-lt"/>
-              <a:buAutoNum type="arabicPeriod"/>
-            </a:pPr>
-            <a:r>
-              <a:rPr lang="en-US" b="0" dirty="0"/>
-              <a:t>Calculate the power used in the network</a:t>
-            </a:r>
-          </a:p>
-          <a:p>
-            <a:pPr marL="980100" lvl="1" indent="-342900">
-              <a:spcBef>
-                <a:spcPts val="200"/>
-              </a:spcBef>
-              <a:spcAft>
-                <a:spcPts val="230"/>
-              </a:spcAft>
-              <a:buFont typeface="+mj-lt"/>
-              <a:buAutoNum type="arabicPeriod"/>
+              <a:buAutoNum type="romanLcPeriod"/>
             </a:pPr>
             <a:r>
               <a:rPr lang="en-US" dirty="0"/>
@@ -16405,8 +17441,8 @@
         </p:nvSpPr>
         <p:spPr>
           <a:xfrm>
-            <a:off x="495443" y="1617629"/>
-            <a:ext cx="8856156" cy="1568380"/>
+            <a:off x="495443" y="1551273"/>
+            <a:ext cx="8856156" cy="1429883"/>
           </a:xfrm>
           <a:prstGeom prst="roundRect">
             <a:avLst/>
@@ -16476,32 +17512,8 @@
               <a:buChar char="•"/>
             </a:pPr>
             <a:r>
-              <a:rPr lang="en-US" sz="1800" b="0" dirty="0"/>
-              <a:t>A piece of </a:t>
-            </a:r>
-            <a:r>
               <a:rPr lang="en-US" dirty="0"/>
-              <a:t>I</a:t>
-            </a:r>
-            <a:r>
-              <a:rPr lang="en-US" sz="1800" b="0" dirty="0"/>
-              <a:t>nformation may have a start date</a:t>
-            </a:r>
-          </a:p>
-          <a:p>
-            <a:pPr marL="285750" indent="-285750">
-              <a:spcBef>
-                <a:spcPts val="200"/>
-              </a:spcBef>
-              <a:spcAft>
-                <a:spcPts val="230"/>
-              </a:spcAft>
-              <a:buFont typeface="Arial" panose="020B0604020202020204" pitchFamily="34" charset="0"/>
-              <a:buChar char="•"/>
-            </a:pPr>
-            <a:r>
-              <a:rPr lang="en-US" dirty="0"/>
-              <a:t>The effect of the Information may have a start and end date</a:t>
+              <a:t>The effect of the information may start later than the date where the information was received TODO</a:t>
             </a:r>
             <a:endParaRPr lang="en-US" sz="1800" b="0" dirty="0"/>
           </a:p>
@@ -16521,8 +17533,8 @@
         </p:nvSpPr>
         <p:spPr>
           <a:xfrm>
-            <a:off x="499161" y="5107283"/>
-            <a:ext cx="8856156" cy="1395109"/>
+            <a:off x="499161" y="4870370"/>
+            <a:ext cx="8856156" cy="1357658"/>
           </a:xfrm>
           <a:prstGeom prst="roundRect">
             <a:avLst/>
@@ -16575,7 +17587,7 @@
             </a:pPr>
             <a:r>
               <a:rPr lang="en-US" dirty="0"/>
-              <a:t>Each household can have electrical appliances and may activate them based on if they possess the specific appliances</a:t>
+              <a:t>Each household may have electrical appliances and may activate them based on if they possess the specific appliances</a:t>
             </a:r>
           </a:p>
         </p:txBody>
@@ -16590,253 +17602,6 @@
   <p:clrMapOvr>
     <a:masterClrMapping/>
   </p:clrMapOvr>
-</p:sld>
-</file>
-
-<file path=ppt/slides/slide9.xml><?xml version="1.0" encoding="utf-8"?>
-<p:sld xmlns:a="http://schemas.openxmlformats.org/drawingml/2006/main" xmlns:r="http://schemas.openxmlformats.org/officeDocument/2006/relationships" xmlns:p="http://schemas.openxmlformats.org/presentationml/2006/main">
-  <p:cSld>
-    <p:spTree>
-      <p:nvGrpSpPr>
-        <p:cNvPr id="1" name=""/>
-        <p:cNvGrpSpPr/>
-        <p:nvPr/>
-      </p:nvGrpSpPr>
-      <p:grpSpPr>
-        <a:xfrm>
-          <a:off x="0" y="0"/>
-          <a:ext cx="0" cy="0"/>
-          <a:chOff x="0" y="0"/>
-          <a:chExt cx="0" cy="0"/>
-        </a:xfrm>
-      </p:grpSpPr>
-      <p:sp>
-        <p:nvSpPr>
-          <p:cNvPr id="2" name="Titel 1">
-            <a:extLst>
-              <a:ext uri="{FF2B5EF4-FFF2-40B4-BE49-F238E27FC236}">
-                <a16:creationId xmlns:a16="http://schemas.microsoft.com/office/drawing/2014/main" id="{676B06DE-4337-3584-9F8E-460629089865}"/>
-              </a:ext>
-            </a:extLst>
-          </p:cNvPr>
-          <p:cNvSpPr>
-            <a:spLocks noGrp="1"/>
-          </p:cNvSpPr>
-          <p:nvPr>
-            <p:ph type="title"/>
-          </p:nvPr>
-        </p:nvSpPr>
-        <p:spPr/>
-        <p:txBody>
-          <a:bodyPr/>
-          <a:lstStyle/>
-          <a:p>
-            <a:r>
-              <a:rPr lang="de-DE" dirty="0"/>
-              <a:t>First Look </a:t>
-            </a:r>
-            <a:r>
-              <a:rPr lang="de-DE" dirty="0" err="1"/>
-              <a:t>into</a:t>
-            </a:r>
-            <a:r>
-              <a:rPr lang="de-DE" dirty="0"/>
-              <a:t> </a:t>
-            </a:r>
-            <a:r>
-              <a:rPr lang="de-DE" dirty="0" err="1"/>
-              <a:t>the</a:t>
-            </a:r>
-            <a:r>
-              <a:rPr lang="de-DE" dirty="0"/>
-              <a:t> Simulator</a:t>
-            </a:r>
-          </a:p>
-        </p:txBody>
-      </p:sp>
-      <p:pic>
-        <p:nvPicPr>
-          <p:cNvPr id="4" name="video">
-            <a:hlinkClick r:id="" action="ppaction://media"/>
-            <a:extLst>
-              <a:ext uri="{FF2B5EF4-FFF2-40B4-BE49-F238E27FC236}">
-                <a16:creationId xmlns:a16="http://schemas.microsoft.com/office/drawing/2014/main" id="{C5136FEA-44A6-7534-BFC4-EC1A5997D9D8}"/>
-              </a:ext>
-            </a:extLst>
-          </p:cNvPr>
-          <p:cNvPicPr>
-            <a:picLocks noGrp="1" noChangeAspect="1"/>
-          </p:cNvPicPr>
-          <p:nvPr>
-            <p:ph idx="1"/>
-            <a:videoFile r:link="rId1"/>
-            <p:extLst>
-              <p:ext uri="{DAA4B4D4-6D71-4841-9C94-3DE7FCFB9230}">
-                <p14:media xmlns:p14="http://schemas.microsoft.com/office/powerpoint/2010/main" r:embed="rId2">
-                  <p14:trim end="6000"/>
-                </p14:media>
-              </p:ext>
-            </p:extLst>
-          </p:nvPr>
-        </p:nvPicPr>
-        <p:blipFill>
-          <a:blip r:embed="rId4"/>
-          <a:stretch>
-            <a:fillRect/>
-          </a:stretch>
-        </p:blipFill>
-        <p:spPr>
-          <a:xfrm>
-            <a:off x="625475" y="1484784"/>
-            <a:ext cx="10942638" cy="4689475"/>
-          </a:xfrm>
-        </p:spPr>
-      </p:pic>
-    </p:spTree>
-    <p:extLst>
-      <p:ext uri="{BB962C8B-B14F-4D97-AF65-F5344CB8AC3E}">
-        <p14:creationId xmlns:p14="http://schemas.microsoft.com/office/powerpoint/2010/main" val="3107658118"/>
-      </p:ext>
-    </p:extLst>
-  </p:cSld>
-  <p:clrMapOvr>
-    <a:masterClrMapping/>
-  </p:clrMapOvr>
-  <p:timing>
-    <p:tnLst>
-      <p:par>
-        <p:cTn id="1" dur="indefinite" restart="never" nodeType="tmRoot">
-          <p:childTnLst>
-            <p:seq concurrent="1" nextAc="seek">
-              <p:cTn id="2" dur="indefinite" nodeType="mainSeq">
-                <p:childTnLst>
-                  <p:par>
-                    <p:cTn id="3" fill="hold">
-                      <p:stCondLst>
-                        <p:cond delay="indefinite"/>
-                      </p:stCondLst>
-                      <p:childTnLst>
-                        <p:par>
-                          <p:cTn id="4" fill="hold">
-                            <p:stCondLst>
-                              <p:cond delay="0"/>
-                            </p:stCondLst>
-                            <p:childTnLst>
-                              <p:par>
-                                <p:cTn id="5" presetID="1" presetClass="mediacall" presetSubtype="0" fill="hold" nodeType="clickEffect">
-                                  <p:stCondLst>
-                                    <p:cond delay="0"/>
-                                  </p:stCondLst>
-                                  <p:childTnLst>
-                                    <p:cmd type="call" cmd="playFrom(0.0)">
-                                      <p:cBhvr>
-                                        <p:cTn id="6" dur="14000" fill="hold"/>
-                                        <p:tgtEl>
-                                          <p:spTgt spid="4"/>
-                                        </p:tgtEl>
-                                      </p:cBhvr>
-                                    </p:cmd>
-                                  </p:childTnLst>
-                                </p:cTn>
-                              </p:par>
-                            </p:childTnLst>
-                          </p:cTn>
-                        </p:par>
-                      </p:childTnLst>
-                    </p:cTn>
-                  </p:par>
-                </p:childTnLst>
-              </p:cTn>
-              <p:prevCondLst>
-                <p:cond evt="onPrev" delay="0">
-                  <p:tgtEl>
-                    <p:sldTgt/>
-                  </p:tgtEl>
-                </p:cond>
-              </p:prevCondLst>
-              <p:nextCondLst>
-                <p:cond evt="onNext" delay="0">
-                  <p:tgtEl>
-                    <p:sldTgt/>
-                  </p:tgtEl>
-                </p:cond>
-              </p:nextCondLst>
-            </p:seq>
-            <p:video>
-              <p:cMediaNode vol="80000">
-                <p:cTn id="7" fill="hold" display="0">
-                  <p:stCondLst>
-                    <p:cond delay="indefinite"/>
-                  </p:stCondLst>
-                </p:cTn>
-                <p:tgtEl>
-                  <p:spTgt spid="4"/>
-                </p:tgtEl>
-              </p:cMediaNode>
-            </p:video>
-            <p:seq concurrent="1" nextAc="seek">
-              <p:cTn id="8" restart="whenNotActive" fill="hold" evtFilter="cancelBubble" nodeType="interactiveSeq">
-                <p:stCondLst>
-                  <p:cond evt="onClick" delay="0">
-                    <p:tgtEl>
-                      <p:spTgt spid="4"/>
-                    </p:tgtEl>
-                  </p:cond>
-                </p:stCondLst>
-                <p:endSync evt="end" delay="0">
-                  <p:rtn val="all"/>
-                </p:endSync>
-                <p:childTnLst>
-                  <p:par>
-                    <p:cTn id="9" fill="hold">
-                      <p:stCondLst>
-                        <p:cond delay="0"/>
-                      </p:stCondLst>
-                      <p:childTnLst>
-                        <p:par>
-                          <p:cTn id="10" fill="hold">
-                            <p:stCondLst>
-                              <p:cond delay="0"/>
-                            </p:stCondLst>
-                            <p:childTnLst>
-                              <p:par>
-                                <p:cTn id="11" presetID="2" presetClass="mediacall" presetSubtype="0" fill="hold" nodeType="clickEffect">
-                                  <p:stCondLst>
-                                    <p:cond delay="0"/>
-                                  </p:stCondLst>
-                                  <p:childTnLst>
-                                    <p:cmd type="call" cmd="togglePause">
-                                      <p:cBhvr>
-                                        <p:cTn id="12" dur="1" fill="hold"/>
-                                        <p:tgtEl>
-                                          <p:spTgt spid="4"/>
-                                        </p:tgtEl>
-                                      </p:cBhvr>
-                                    </p:cmd>
-                                  </p:childTnLst>
-                                </p:cTn>
-                              </p:par>
-                            </p:childTnLst>
-                          </p:cTn>
-                        </p:par>
-                      </p:childTnLst>
-                    </p:cTn>
-                  </p:par>
-                </p:childTnLst>
-              </p:cTn>
-              <p:nextCondLst>
-                <p:cond evt="onClick" delay="0">
-                  <p:tgtEl>
-                    <p:spTgt spid="4"/>
-                  </p:tgtEl>
-                </p:cond>
-              </p:nextCondLst>
-            </p:seq>
-          </p:childTnLst>
-        </p:cTn>
-      </p:par>
-    </p:tnLst>
-  </p:timing>
 </p:sld>
 </file>
 

</xml_diff>